<commit_message>
Fixes typo on Slide 6 and improves visual formatting.
</commit_message>
<xml_diff>
--- a/ULI101-9.1.pptx
+++ b/ULI101-9.1.pptx
@@ -213,7 +213,7 @@
           <a:p>
             <a:fld id="{92107E4A-59D9-C648-BC62-133DA4EC414F}" type="datetimeFigureOut">
               <a:rPr lang="en-US" smtClean="0"/>
-              <a:t>4/29/2022</a:t>
+              <a:t>3/16/23</a:t>
             </a:fld>
             <a:endParaRPr lang="en-US"/>
           </a:p>
@@ -703,7 +703,7 @@
           <a:p>
             <a:fld id="{4AB1357F-A277-7442-BEE7-4FE250216E54}" type="datetimeFigureOut">
               <a:rPr lang="en-US" smtClean="0"/>
-              <a:t>4/29/2022</a:t>
+              <a:t>3/16/23</a:t>
             </a:fld>
             <a:endParaRPr lang="en-US"/>
           </a:p>
@@ -914,7 +914,7 @@
           <a:p>
             <a:fld id="{4AB1357F-A277-7442-BEE7-4FE250216E54}" type="datetimeFigureOut">
               <a:rPr lang="en-US" smtClean="0"/>
-              <a:t>4/29/2022</a:t>
+              <a:t>3/16/23</a:t>
             </a:fld>
             <a:endParaRPr lang="en-US"/>
           </a:p>
@@ -1129,7 +1129,7 @@
           <a:p>
             <a:fld id="{4AB1357F-A277-7442-BEE7-4FE250216E54}" type="datetimeFigureOut">
               <a:rPr lang="en-US" smtClean="0"/>
-              <a:t>4/29/2022</a:t>
+              <a:t>3/16/23</a:t>
             </a:fld>
             <a:endParaRPr lang="en-US"/>
           </a:p>
@@ -1330,7 +1330,7 @@
           <a:p>
             <a:fld id="{4AB1357F-A277-7442-BEE7-4FE250216E54}" type="datetimeFigureOut">
               <a:rPr lang="en-US" smtClean="0"/>
-              <a:t>4/29/2022</a:t>
+              <a:t>3/16/23</a:t>
             </a:fld>
             <a:endParaRPr lang="en-US"/>
           </a:p>
@@ -1609,7 +1609,7 @@
           <a:p>
             <a:fld id="{4AB1357F-A277-7442-BEE7-4FE250216E54}" type="datetimeFigureOut">
               <a:rPr lang="en-US" smtClean="0"/>
-              <a:t>4/29/2022</a:t>
+              <a:t>3/16/23</a:t>
             </a:fld>
             <a:endParaRPr lang="en-US"/>
           </a:p>
@@ -1877,7 +1877,7 @@
           <a:p>
             <a:fld id="{4AB1357F-A277-7442-BEE7-4FE250216E54}" type="datetimeFigureOut">
               <a:rPr lang="en-US" smtClean="0"/>
-              <a:t>4/29/2022</a:t>
+              <a:t>3/16/23</a:t>
             </a:fld>
             <a:endParaRPr lang="en-US"/>
           </a:p>
@@ -2293,7 +2293,7 @@
           <a:p>
             <a:fld id="{4AB1357F-A277-7442-BEE7-4FE250216E54}" type="datetimeFigureOut">
               <a:rPr lang="en-US" smtClean="0"/>
-              <a:t>4/29/2022</a:t>
+              <a:t>3/16/23</a:t>
             </a:fld>
             <a:endParaRPr lang="en-US"/>
           </a:p>
@@ -2442,7 +2442,7 @@
           <a:p>
             <a:fld id="{4AB1357F-A277-7442-BEE7-4FE250216E54}" type="datetimeFigureOut">
               <a:rPr lang="en-US" smtClean="0"/>
-              <a:t>4/29/2022</a:t>
+              <a:t>3/16/23</a:t>
             </a:fld>
             <a:endParaRPr lang="en-US"/>
           </a:p>
@@ -2568,7 +2568,7 @@
           <a:p>
             <a:fld id="{4AB1357F-A277-7442-BEE7-4FE250216E54}" type="datetimeFigureOut">
               <a:rPr lang="en-US" smtClean="0"/>
-              <a:t>4/29/2022</a:t>
+              <a:t>3/16/23</a:t>
             </a:fld>
             <a:endParaRPr lang="en-US"/>
           </a:p>
@@ -2819,7 +2819,7 @@
           <a:p>
             <a:fld id="{4AB1357F-A277-7442-BEE7-4FE250216E54}" type="datetimeFigureOut">
               <a:rPr lang="en-US" smtClean="0"/>
-              <a:t>4/29/2022</a:t>
+              <a:t>3/16/23</a:t>
             </a:fld>
             <a:endParaRPr lang="en-US"/>
           </a:p>
@@ -3264,7 +3264,7 @@
           <a:p>
             <a:fld id="{4AB1357F-A277-7442-BEE7-4FE250216E54}" type="datetimeFigureOut">
               <a:rPr lang="en-US" smtClean="0"/>
-              <a:t>4/29/2022</a:t>
+              <a:t>3/16/23</a:t>
             </a:fld>
             <a:endParaRPr lang="en-US"/>
           </a:p>
@@ -3591,7 +3591,7 @@
           <a:p>
             <a:fld id="{4AB1357F-A277-7442-BEE7-4FE250216E54}" type="datetimeFigureOut">
               <a:rPr lang="en-US" smtClean="0"/>
-              <a:t>4/29/2022</a:t>
+              <a:t>3/16/23</a:t>
             </a:fld>
             <a:endParaRPr lang="en-US"/>
           </a:p>
@@ -4095,13 +4095,13 @@
         </p:nvSpPr>
         <p:spPr>
           <a:xfrm>
-            <a:off x="1964987" y="802298"/>
+            <a:off x="1964987" y="560998"/>
             <a:ext cx="9089865" cy="3822329"/>
           </a:xfrm>
         </p:spPr>
         <p:txBody>
           <a:bodyPr>
-            <a:normAutofit fontScale="90000"/>
+            <a:normAutofit/>
           </a:bodyPr>
           <a:lstStyle/>
           <a:p>
@@ -4121,20 +4121,12 @@
               <a:rPr lang="en-US" sz="2400" dirty="0"/>
               <a:t>ULI101:  Introduction to Unix / Linux and the Internet</a:t>
             </a:r>
-            <a:r>
-              <a:rPr lang="en-US" dirty="0"/>
-              <a:t/>
-            </a:r>
             <a:br>
               <a:rPr lang="en-US" dirty="0"/>
             </a:br>
             <a:r>
               <a:rPr lang="en-US" sz="1200" dirty="0"/>
               <a:t> </a:t>
-            </a:r>
-            <a:r>
-              <a:rPr lang="en-US" dirty="0"/>
-              <a:t/>
             </a:r>
             <a:br>
               <a:rPr lang="en-US" dirty="0"/>
@@ -4156,23 +4148,7 @@
                   <a:srgbClr val="0070C0"/>
                 </a:solidFill>
               </a:rPr>
-              <a:t>Week </a:t>
-            </a:r>
-            <a:r>
-              <a:rPr lang="en-US" sz="2200" dirty="0" smtClean="0">
-                <a:solidFill>
-                  <a:srgbClr val="0070C0"/>
-                </a:solidFill>
-              </a:rPr>
-              <a:t>9 </a:t>
-            </a:r>
-            <a:r>
-              <a:rPr lang="en-US" sz="2200" dirty="0">
-                <a:solidFill>
-                  <a:srgbClr val="0070C0"/>
-                </a:solidFill>
-              </a:rPr>
-              <a:t>lesson 1</a:t>
+              <a:t>Week 9 lesson 1</a:t>
             </a:r>
             <a:br>
               <a:rPr lang="en-US" sz="2200" dirty="0">
@@ -4181,10 +4157,6 @@
                 </a:solidFill>
               </a:rPr>
             </a:br>
-            <a:r>
-              <a:rPr lang="en-US" sz="2200" dirty="0"/>
-              <a:t/>
-            </a:r>
             <a:br>
               <a:rPr lang="en-US" sz="2200" dirty="0"/>
             </a:br>
@@ -4219,35 +4191,6 @@
               </a:rPr>
               <a:t>   Simple AND COMPLEX REGULAR EXPRESSIONS </a:t>
             </a:r>
-            <a:br>
-              <a:rPr lang="en-CA" sz="2200" dirty="0">
-                <a:solidFill>
-                  <a:srgbClr val="0070C0"/>
-                </a:solidFill>
-              </a:rPr>
-            </a:br>
-            <a:r>
-              <a:rPr lang="en-CA" sz="2200" dirty="0">
-                <a:solidFill>
-                  <a:srgbClr val="0070C0"/>
-                </a:solidFill>
-              </a:rPr>
-              <a:t>   </a:t>
-            </a:r>
-            <a:r>
-              <a:rPr lang="en-CA" dirty="0"/>
-              <a:t/>
-            </a:r>
-            <a:br>
-              <a:rPr lang="en-CA" dirty="0"/>
-            </a:br>
-            <a:r>
-              <a:rPr lang="en-US" sz="2400" dirty="0"/>
-              <a:t/>
-            </a:r>
-            <a:br>
-              <a:rPr lang="en-US" sz="2400" dirty="0"/>
-            </a:br>
             <a:endParaRPr lang="en-US" dirty="0"/>
           </a:p>
         </p:txBody>
@@ -4307,13 +4250,6 @@
   <p:clrMapOvr>
     <a:masterClrMapping/>
   </p:clrMapOvr>
-  <p:timing>
-    <p:tnLst>
-      <p:par>
-        <p:cTn id="1" dur="indefinite" restart="never" nodeType="tmRoot"/>
-      </p:par>
-    </p:tnLst>
-  </p:timing>
 </p:sld>
 </file>
 
@@ -4389,7 +4325,7 @@
         </p:spPr>
         <p:txBody>
           <a:bodyPr>
-            <a:normAutofit fontScale="85000" lnSpcReduction="20000"/>
+            <a:normAutofit/>
           </a:bodyPr>
           <a:lstStyle/>
           <a:p>
@@ -4400,10 +4336,6 @@
               <a:rPr lang="en-CA" sz="2400" b="1" dirty="0"/>
               <a:t>Complex Regular Expressions Symbols</a:t>
             </a:r>
-            <a:br>
-              <a:rPr lang="en-CA" sz="2400" b="1" dirty="0"/>
-            </a:br>
-            <a:endParaRPr lang="en-CA" sz="2400" b="1" dirty="0"/>
           </a:p>
           <a:p>
             <a:pPr marL="0" indent="0">
@@ -4444,10 +4376,6 @@
               <a:rPr lang="en-CA" dirty="0"/>
               <a:t> patterns.</a:t>
             </a:r>
-            <a:br>
-              <a:rPr lang="en-CA" dirty="0"/>
-            </a:br>
-            <a:endParaRPr lang="en-CA" dirty="0"/>
           </a:p>
           <a:p>
             <a:pPr marL="0" indent="0">
@@ -4468,17 +4396,6 @@
               <a:rPr lang="en-CA" dirty="0"/>
               <a:t>are displayed below:</a:t>
             </a:r>
-            <a:br>
-              <a:rPr lang="en-CA" dirty="0"/>
-            </a:br>
-            <a:r>
-              <a:rPr lang="en-CA" dirty="0"/>
-              <a:t/>
-            </a:r>
-            <a:br>
-              <a:rPr lang="en-CA" dirty="0"/>
-            </a:br>
-            <a:endParaRPr lang="en-CA" dirty="0"/>
           </a:p>
           <a:p>
             <a:pPr marL="457200" lvl="1" indent="0">
@@ -4601,51 +4518,6 @@
               </a:rPr>
               <a:t>*</a:t>
             </a:r>
-            <a:r>
-              <a:rPr lang="en-US" b="1" dirty="0">
-                <a:solidFill>
-                  <a:srgbClr val="0070C0"/>
-                </a:solidFill>
-              </a:rPr>
-              <a:t/>
-            </a:r>
-            <a:br>
-              <a:rPr lang="en-US" b="1" dirty="0">
-                <a:solidFill>
-                  <a:srgbClr val="0070C0"/>
-                </a:solidFill>
-              </a:rPr>
-            </a:br>
-            <a:r>
-              <a:rPr lang="en-US" b="1" dirty="0">
-                <a:solidFill>
-                  <a:srgbClr val="0070C0"/>
-                </a:solidFill>
-              </a:rPr>
-              <a:t/>
-            </a:r>
-            <a:br>
-              <a:rPr lang="en-US" b="1" dirty="0">
-                <a:solidFill>
-                  <a:srgbClr val="0070C0"/>
-                </a:solidFill>
-              </a:rPr>
-            </a:br>
-            <a:r>
-              <a:rPr lang="en-US" b="1" dirty="0">
-                <a:solidFill>
-                  <a:srgbClr val="0070C0"/>
-                </a:solidFill>
-              </a:rPr>
-              <a:t/>
-            </a:r>
-            <a:br>
-              <a:rPr lang="en-US" b="1" dirty="0">
-                <a:solidFill>
-                  <a:srgbClr val="0070C0"/>
-                </a:solidFill>
-              </a:rPr>
-            </a:br>
             <a:endParaRPr lang="en-CA" b="1" dirty="0">
               <a:solidFill>
                 <a:srgbClr val="0070C0"/>
@@ -4672,7 +4544,7 @@
           <a:blip r:embed="rId2">
             <a:extLst>
               <a:ext uri="{837473B0-CC2E-450A-ABE3-18F120FF3D39}">
-                <a1611:picAttrSrcUrl xmlns:a1611="http://schemas.microsoft.com/office/drawing/2016/11/main" xmlns="" r:id="rId3"/>
+                <a1611:picAttrSrcUrl xmlns:a1611="http://schemas.microsoft.com/office/drawing/2016/11/main" r:id="rId3"/>
               </a:ext>
             </a:extLst>
           </a:blip>
@@ -4785,26 +4657,39 @@
                                   </p:childTnLst>
                                 </p:cTn>
                               </p:par>
-                            </p:childTnLst>
-                          </p:cTn>
-                        </p:par>
-                      </p:childTnLst>
-                    </p:cTn>
-                  </p:par>
-                  <p:par>
-                    <p:cTn id="9" fill="hold">
-                      <p:stCondLst>
-                        <p:cond delay="indefinite"/>
-                      </p:stCondLst>
-                      <p:childTnLst>
-                        <p:par>
-                          <p:cTn id="10" fill="hold">
-                            <p:stCondLst>
-                              <p:cond delay="0"/>
-                            </p:stCondLst>
-                            <p:childTnLst>
                               <p:par>
-                                <p:cTn id="11" presetID="1" presetClass="entr" presetSubtype="0" fill="hold" grpId="0" nodeType="clickEffect">
+                                <p:cTn id="9" presetID="1" presetClass="entr" presetSubtype="0" fill="hold" grpId="0" nodeType="withEffect">
+                                  <p:stCondLst>
+                                    <p:cond delay="0"/>
+                                  </p:stCondLst>
+                                  <p:childTnLst>
+                                    <p:set>
+                                      <p:cBhvr>
+                                        <p:cTn id="10" dur="1" fill="hold">
+                                          <p:stCondLst>
+                                            <p:cond delay="0"/>
+                                          </p:stCondLst>
+                                        </p:cTn>
+                                        <p:tgtEl>
+                                          <p:spTgt spid="3">
+                                            <p:txEl>
+                                              <p:pRg st="2" end="2"/>
+                                            </p:txEl>
+                                          </p:spTgt>
+                                        </p:tgtEl>
+                                        <p:attrNameLst>
+                                          <p:attrName>style.visibility</p:attrName>
+                                        </p:attrNameLst>
+                                      </p:cBhvr>
+                                      <p:to>
+                                        <p:strVal val="visible"/>
+                                      </p:to>
+                                    </p:set>
+                                  </p:childTnLst>
+                                </p:cTn>
+                              </p:par>
+                              <p:par>
+                                <p:cTn id="11" presetID="1" presetClass="entr" presetSubtype="0" fill="hold" grpId="0" nodeType="withEffect">
                                   <p:stCondLst>
                                     <p:cond delay="0"/>
                                   </p:stCondLst>
@@ -4819,7 +4704,7 @@
                                         <p:tgtEl>
                                           <p:spTgt spid="3">
                                             <p:txEl>
-                                              <p:pRg st="2" end="2"/>
+                                              <p:pRg st="3" end="3"/>
                                             </p:txEl>
                                           </p:spTgt>
                                         </p:tgtEl>
@@ -4850,7 +4735,7 @@
                                         <p:tgtEl>
                                           <p:spTgt spid="3">
                                             <p:txEl>
-                                              <p:pRg st="3" end="3"/>
+                                              <p:pRg st="4" end="4"/>
                                             </p:txEl>
                                           </p:spTgt>
                                         </p:tgtEl>
@@ -4881,7 +4766,7 @@
                                         <p:tgtEl>
                                           <p:spTgt spid="3">
                                             <p:txEl>
-                                              <p:pRg st="4" end="4"/>
+                                              <p:pRg st="5" end="5"/>
                                             </p:txEl>
                                           </p:spTgt>
                                         </p:tgtEl>
@@ -4905,37 +4790,6 @@
                                     <p:set>
                                       <p:cBhvr>
                                         <p:cTn id="18" dur="1" fill="hold">
-                                          <p:stCondLst>
-                                            <p:cond delay="0"/>
-                                          </p:stCondLst>
-                                        </p:cTn>
-                                        <p:tgtEl>
-                                          <p:spTgt spid="3">
-                                            <p:txEl>
-                                              <p:pRg st="5" end="5"/>
-                                            </p:txEl>
-                                          </p:spTgt>
-                                        </p:tgtEl>
-                                        <p:attrNameLst>
-                                          <p:attrName>style.visibility</p:attrName>
-                                        </p:attrNameLst>
-                                      </p:cBhvr>
-                                      <p:to>
-                                        <p:strVal val="visible"/>
-                                      </p:to>
-                                    </p:set>
-                                  </p:childTnLst>
-                                </p:cTn>
-                              </p:par>
-                              <p:par>
-                                <p:cTn id="19" presetID="1" presetClass="entr" presetSubtype="0" fill="hold" grpId="0" nodeType="withEffect">
-                                  <p:stCondLst>
-                                    <p:cond delay="0"/>
-                                  </p:stCondLst>
-                                  <p:childTnLst>
-                                    <p:set>
-                                      <p:cBhvr>
-                                        <p:cTn id="20" dur="1" fill="hold">
                                           <p:stCondLst>
                                             <p:cond delay="0"/>
                                           </p:stCondLst>
@@ -5069,7 +4923,7 @@
         </p:spPr>
         <p:txBody>
           <a:bodyPr>
-            <a:normAutofit fontScale="85000" lnSpcReduction="20000"/>
+            <a:normAutofit/>
           </a:bodyPr>
           <a:lstStyle/>
           <a:p>
@@ -5080,9 +4934,6 @@
               <a:rPr lang="en-CA" sz="2400" b="1" dirty="0"/>
               <a:t>Complex Regular Expressions Symbols</a:t>
             </a:r>
-            <a:br>
-              <a:rPr lang="en-CA" sz="2400" b="1" dirty="0"/>
-            </a:br>
             <a:endParaRPr lang="en-CA" sz="1800" b="1" dirty="0"/>
           </a:p>
           <a:p>
@@ -5125,20 +4976,11 @@
               </a:rPr>
               <a:t>$</a:t>
             </a:r>
-            <a:r>
-              <a:rPr lang="en-US" dirty="0"/>
-              <a:t/>
-            </a:r>
-            <a:br>
-              <a:rPr lang="en-US" dirty="0"/>
-            </a:br>
-            <a:r>
-              <a:rPr lang="en-US" dirty="0"/>
-              <a:t/>
-            </a:r>
-            <a:br>
-              <a:rPr lang="en-US" dirty="0"/>
-            </a:br>
+          </a:p>
+          <a:p>
+            <a:pPr marL="0" indent="0">
+              <a:buNone/>
+            </a:pPr>
             <a:r>
               <a:rPr lang="en-CA" b="1" dirty="0"/>
               <a:t>Anchors</a:t>
@@ -5153,19 +4995,8 @@
             </a:r>
             <a:r>
               <a:rPr lang="en-CA" dirty="0"/>
-              <a:t> position</a:t>
-            </a:r>
-            <a:br>
-              <a:rPr lang="en-CA" dirty="0"/>
-            </a:br>
-            <a:r>
-              <a:rPr lang="en-CA" dirty="0"/>
-              <a:t>(at beginning or ending of a string of text). </a:t>
-            </a:r>
-            <a:br>
-              <a:rPr lang="en-CA" dirty="0"/>
-            </a:br>
-            <a:endParaRPr lang="en-CA" dirty="0"/>
+              <a:t> position (at beginning or ending of a string of text). </a:t>
+            </a:r>
           </a:p>
           <a:p>
             <a:pPr marL="0" indent="0">
@@ -5195,9 +5026,11 @@
               <a:rPr lang="en-CA" dirty="0"/>
               <a:t> of the string. </a:t>
             </a:r>
-            <a:br>
-              <a:rPr lang="en-CA" dirty="0"/>
-            </a:br>
+          </a:p>
+          <a:p>
+            <a:pPr marL="0" indent="0">
+              <a:buNone/>
+            </a:pPr>
             <a:r>
               <a:rPr lang="en-CA" dirty="0"/>
               <a:t>The </a:t>
@@ -5222,10 +5055,6 @@
               <a:rPr lang="en-CA" dirty="0"/>
               <a:t> of the string.</a:t>
             </a:r>
-            <a:br>
-              <a:rPr lang="en-CA" dirty="0"/>
-            </a:br>
-            <a:endParaRPr lang="en-CA" dirty="0"/>
           </a:p>
           <a:p>
             <a:pPr marL="0" indent="0">
@@ -5237,13 +5066,6 @@
             </a:r>
             <a:br>
               <a:rPr lang="en-CA" i="1" dirty="0"/>
-            </a:br>
-            <a:r>
-              <a:rPr lang="en-CA" dirty="0"/>
-              <a:t/>
-            </a:r>
-            <a:br>
-              <a:rPr lang="en-CA" dirty="0"/>
             </a:br>
             <a:r>
               <a:rPr lang="en-CA" b="1" dirty="0">
@@ -5264,16 +5086,6 @@
                 <a:cs typeface="Courier New" panose="02070309020205020404" pitchFamily="49" charset="0"/>
               </a:rPr>
               <a:t>data.txt</a:t>
-            </a:r>
-            <a:r>
-              <a:rPr lang="en-CA" b="1" dirty="0">
-                <a:solidFill>
-                  <a:srgbClr val="0070C0"/>
-                </a:solidFill>
-                <a:latin typeface="Courier New" panose="02070309020205020404" pitchFamily="49" charset="0"/>
-                <a:cs typeface="Courier New" panose="02070309020205020404" pitchFamily="49" charset="0"/>
-              </a:rPr>
-              <a:t/>
             </a:r>
             <a:br>
               <a:rPr lang="en-CA" b="1" dirty="0">
@@ -5304,25 +5116,6 @@
               </a:rPr>
               <a:t>data.txt</a:t>
             </a:r>
-            <a:r>
-              <a:rPr lang="en-CA" b="1" dirty="0">
-                <a:solidFill>
-                  <a:srgbClr val="0070C0"/>
-                </a:solidFill>
-                <a:latin typeface="Courier New" panose="02070309020205020404" pitchFamily="49" charset="0"/>
-                <a:cs typeface="Courier New" panose="02070309020205020404" pitchFamily="49" charset="0"/>
-              </a:rPr>
-              <a:t/>
-            </a:r>
-            <a:br>
-              <a:rPr lang="en-CA" b="1" dirty="0">
-                <a:solidFill>
-                  <a:srgbClr val="0070C0"/>
-                </a:solidFill>
-                <a:latin typeface="Courier New" panose="02070309020205020404" pitchFamily="49" charset="0"/>
-                <a:cs typeface="Courier New" panose="02070309020205020404" pitchFamily="49" charset="0"/>
-              </a:rPr>
-            </a:br>
             <a:endParaRPr lang="en-CA" b="1" dirty="0">
               <a:solidFill>
                 <a:srgbClr val="0070C0"/>
@@ -5355,7 +5148,7 @@
         </p:blipFill>
         <p:spPr>
           <a:xfrm>
-            <a:off x="9001290" y="4301067"/>
+            <a:off x="8251495" y="2903691"/>
             <a:ext cx="2803359" cy="2362014"/>
           </a:xfrm>
           <a:prstGeom prst="rect">
@@ -5463,33 +5256,15 @@
                                   </p:childTnLst>
                                 </p:cTn>
                               </p:par>
-                            </p:childTnLst>
-                          </p:cTn>
-                        </p:par>
-                      </p:childTnLst>
-                    </p:cTn>
-                  </p:par>
-                  <p:par>
-                    <p:cTn id="9" fill="hold">
-                      <p:stCondLst>
-                        <p:cond delay="indefinite"/>
-                      </p:stCondLst>
-                      <p:childTnLst>
-                        <p:par>
-                          <p:cTn id="10" fill="hold">
-                            <p:stCondLst>
-                              <p:cond delay="0"/>
-                            </p:stCondLst>
-                            <p:childTnLst>
                               <p:par>
-                                <p:cTn id="11" presetID="1" presetClass="entr" presetSubtype="0" fill="hold" grpId="0" nodeType="clickEffect">
+                                <p:cTn id="9" presetID="1" presetClass="entr" presetSubtype="0" fill="hold" grpId="0" nodeType="withEffect">
                                   <p:stCondLst>
                                     <p:cond delay="0"/>
                                   </p:stCondLst>
                                   <p:childTnLst>
                                     <p:set>
                                       <p:cBhvr>
-                                        <p:cTn id="12" dur="1" fill="hold">
+                                        <p:cTn id="10" dur="1" fill="hold">
                                           <p:stCondLst>
                                             <p:cond delay="0"/>
                                           </p:stCondLst>
@@ -5512,26 +5287,70 @@
                                   </p:childTnLst>
                                 </p:cTn>
                               </p:par>
-                            </p:childTnLst>
-                          </p:cTn>
-                        </p:par>
-                      </p:childTnLst>
-                    </p:cTn>
-                  </p:par>
-                  <p:par>
-                    <p:cTn id="13" fill="hold">
-                      <p:stCondLst>
-                        <p:cond delay="indefinite"/>
-                      </p:stCondLst>
-                      <p:childTnLst>
-                        <p:par>
-                          <p:cTn id="14" fill="hold">
-                            <p:stCondLst>
-                              <p:cond delay="0"/>
-                            </p:stCondLst>
-                            <p:childTnLst>
                               <p:par>
-                                <p:cTn id="15" presetID="1" presetClass="entr" presetSubtype="0" fill="hold" grpId="0" nodeType="clickEffect">
+                                <p:cTn id="11" presetID="1" presetClass="entr" presetSubtype="0" fill="hold" grpId="0" nodeType="withEffect">
+                                  <p:stCondLst>
+                                    <p:cond delay="0"/>
+                                  </p:stCondLst>
+                                  <p:childTnLst>
+                                    <p:set>
+                                      <p:cBhvr>
+                                        <p:cTn id="12" dur="1" fill="hold">
+                                          <p:stCondLst>
+                                            <p:cond delay="0"/>
+                                          </p:stCondLst>
+                                        </p:cTn>
+                                        <p:tgtEl>
+                                          <p:spTgt spid="3">
+                                            <p:txEl>
+                                              <p:pRg st="3" end="3"/>
+                                            </p:txEl>
+                                          </p:spTgt>
+                                        </p:tgtEl>
+                                        <p:attrNameLst>
+                                          <p:attrName>style.visibility</p:attrName>
+                                        </p:attrNameLst>
+                                      </p:cBhvr>
+                                      <p:to>
+                                        <p:strVal val="visible"/>
+                                      </p:to>
+                                    </p:set>
+                                  </p:childTnLst>
+                                </p:cTn>
+                              </p:par>
+                              <p:par>
+                                <p:cTn id="13" presetID="1" presetClass="entr" presetSubtype="0" fill="hold" grpId="0" nodeType="withEffect">
+                                  <p:stCondLst>
+                                    <p:cond delay="0"/>
+                                  </p:stCondLst>
+                                  <p:childTnLst>
+                                    <p:set>
+                                      <p:cBhvr>
+                                        <p:cTn id="14" dur="1" fill="hold">
+                                          <p:stCondLst>
+                                            <p:cond delay="0"/>
+                                          </p:stCondLst>
+                                        </p:cTn>
+                                        <p:tgtEl>
+                                          <p:spTgt spid="3">
+                                            <p:txEl>
+                                              <p:pRg st="4" end="4"/>
+                                            </p:txEl>
+                                          </p:spTgt>
+                                        </p:tgtEl>
+                                        <p:attrNameLst>
+                                          <p:attrName>style.visibility</p:attrName>
+                                        </p:attrNameLst>
+                                      </p:cBhvr>
+                                      <p:to>
+                                        <p:strVal val="visible"/>
+                                      </p:to>
+                                    </p:set>
+                                  </p:childTnLst>
+                                </p:cTn>
+                              </p:par>
+                              <p:par>
+                                <p:cTn id="15" presetID="1" presetClass="entr" presetSubtype="0" fill="hold" grpId="0" nodeType="withEffect">
                                   <p:stCondLst>
                                     <p:cond delay="0"/>
                                   </p:stCondLst>
@@ -5546,7 +5365,7 @@
                                         <p:tgtEl>
                                           <p:spTgt spid="3">
                                             <p:txEl>
-                                              <p:pRg st="3" end="3"/>
+                                              <p:pRg st="5" end="5"/>
                                             </p:txEl>
                                           </p:spTgt>
                                         </p:tgtEl>
@@ -5694,7 +5513,7 @@
         </p:spPr>
         <p:txBody>
           <a:bodyPr>
-            <a:normAutofit fontScale="77500" lnSpcReduction="20000"/>
+            <a:normAutofit/>
           </a:bodyPr>
           <a:lstStyle/>
           <a:p>
@@ -5705,9 +5524,6 @@
               <a:rPr lang="en-CA" sz="2400" b="1" dirty="0"/>
               <a:t>Complex Regular Expressions Symbols</a:t>
             </a:r>
-            <a:br>
-              <a:rPr lang="en-CA" sz="2400" b="1" dirty="0"/>
-            </a:br>
             <a:endParaRPr lang="en-CA" sz="1800" b="1" dirty="0"/>
           </a:p>
           <a:p>
@@ -5769,10 +5585,6 @@
               <a:rPr lang="en-US" dirty="0"/>
               <a:t> character.</a:t>
             </a:r>
-            <a:br>
-              <a:rPr lang="en-US" dirty="0"/>
-            </a:br>
-            <a:endParaRPr lang="en-US" dirty="0"/>
           </a:p>
           <a:p>
             <a:pPr marL="0" indent="0">
@@ -5788,14 +5600,7 @@
             </a:r>
             <a:r>
               <a:rPr lang="en-US" dirty="0"/>
-              <a:t> of period symbols) </a:t>
-            </a:r>
-            <a:br>
-              <a:rPr lang="en-US" dirty="0"/>
-            </a:br>
-            <a:r>
-              <a:rPr lang="en-US" dirty="0"/>
-              <a:t>are effective when used with </a:t>
+              <a:t> of period symbols) are effective when used with </a:t>
             </a:r>
             <a:r>
               <a:rPr lang="en-US" b="1" dirty="0"/>
@@ -5805,10 +5610,6 @@
               <a:rPr lang="en-US" dirty="0"/>
               <a:t>.</a:t>
             </a:r>
-            <a:br>
-              <a:rPr lang="en-US" dirty="0"/>
-            </a:br>
-            <a:endParaRPr lang="en-US" dirty="0"/>
           </a:p>
           <a:p>
             <a:pPr marL="0" indent="0">
@@ -5818,16 +5619,11 @@
               <a:rPr lang="en-US" i="1" dirty="0"/>
               <a:t>Examples:</a:t>
             </a:r>
-            <a:br>
-              <a:rPr lang="en-US" i="1" dirty="0"/>
-            </a:br>
-            <a:r>
-              <a:rPr lang="en-US" b="1" dirty="0"/>
-              <a:t/>
-            </a:r>
-            <a:br>
-              <a:rPr lang="en-US" b="1" dirty="0"/>
-            </a:br>
+          </a:p>
+          <a:p>
+            <a:pPr marL="0" indent="0">
+              <a:buNone/>
+            </a:pPr>
             <a:r>
               <a:rPr lang="en-US" b="1" dirty="0">
                 <a:solidFill>
@@ -5847,16 +5643,6 @@
                 <a:cs typeface="Courier New" panose="02070309020205020404" pitchFamily="49" charset="0"/>
               </a:rPr>
               <a:t>data.txt</a:t>
-            </a:r>
-            <a:r>
-              <a:rPr lang="en-US" b="1" dirty="0">
-                <a:solidFill>
-                  <a:srgbClr val="0070C0"/>
-                </a:solidFill>
-                <a:latin typeface="Courier New" panose="02070309020205020404" pitchFamily="49" charset="0"/>
-                <a:cs typeface="Courier New" panose="02070309020205020404" pitchFamily="49" charset="0"/>
-              </a:rPr>
-              <a:t/>
             </a:r>
             <a:br>
               <a:rPr lang="en-US" b="1" dirty="0">
@@ -5887,99 +5673,6 @@
               </a:rPr>
               <a:t>data.txt</a:t>
             </a:r>
-            <a:r>
-              <a:rPr lang="en-US" b="1" dirty="0">
-                <a:solidFill>
-                  <a:srgbClr val="0070C0"/>
-                </a:solidFill>
-                <a:latin typeface="Courier New" panose="02070309020205020404" pitchFamily="49" charset="0"/>
-                <a:cs typeface="Courier New" panose="02070309020205020404" pitchFamily="49" charset="0"/>
-              </a:rPr>
-              <a:t/>
-            </a:r>
-            <a:br>
-              <a:rPr lang="en-US" b="1" dirty="0">
-                <a:solidFill>
-                  <a:srgbClr val="0070C0"/>
-                </a:solidFill>
-                <a:latin typeface="Courier New" panose="02070309020205020404" pitchFamily="49" charset="0"/>
-                <a:cs typeface="Courier New" panose="02070309020205020404" pitchFamily="49" charset="0"/>
-              </a:rPr>
-            </a:br>
-            <a:r>
-              <a:rPr lang="en-US" b="1" dirty="0">
-                <a:solidFill>
-                  <a:srgbClr val="0070C0"/>
-                </a:solidFill>
-                <a:latin typeface="Courier New" panose="02070309020205020404" pitchFamily="49" charset="0"/>
-                <a:cs typeface="Courier New" panose="02070309020205020404" pitchFamily="49" charset="0"/>
-              </a:rPr>
-              <a:t/>
-            </a:r>
-            <a:br>
-              <a:rPr lang="en-US" b="1" dirty="0">
-                <a:solidFill>
-                  <a:srgbClr val="0070C0"/>
-                </a:solidFill>
-                <a:latin typeface="Courier New" panose="02070309020205020404" pitchFamily="49" charset="0"/>
-                <a:cs typeface="Courier New" panose="02070309020205020404" pitchFamily="49" charset="0"/>
-              </a:rPr>
-            </a:br>
-            <a:r>
-              <a:rPr lang="en-US" b="1" dirty="0">
-                <a:solidFill>
-                  <a:srgbClr val="0070C0"/>
-                </a:solidFill>
-                <a:latin typeface="Courier New" panose="02070309020205020404" pitchFamily="49" charset="0"/>
-                <a:cs typeface="Courier New" panose="02070309020205020404" pitchFamily="49" charset="0"/>
-              </a:rPr>
-              <a:t/>
-            </a:r>
-            <a:br>
-              <a:rPr lang="en-US" b="1" dirty="0">
-                <a:solidFill>
-                  <a:srgbClr val="0070C0"/>
-                </a:solidFill>
-                <a:latin typeface="Courier New" panose="02070309020205020404" pitchFamily="49" charset="0"/>
-                <a:cs typeface="Courier New" panose="02070309020205020404" pitchFamily="49" charset="0"/>
-              </a:rPr>
-            </a:br>
-            <a:endParaRPr lang="en-US" b="1" dirty="0">
-              <a:solidFill>
-                <a:srgbClr val="0070C0"/>
-              </a:solidFill>
-              <a:latin typeface="Courier New" panose="02070309020205020404" pitchFamily="49" charset="0"/>
-              <a:cs typeface="Courier New" panose="02070309020205020404" pitchFamily="49" charset="0"/>
-            </a:endParaRPr>
-          </a:p>
-          <a:p>
-            <a:pPr marL="0" indent="0">
-              <a:buNone/>
-            </a:pPr>
-            <a:endParaRPr lang="en-US" b="1" dirty="0">
-              <a:solidFill>
-                <a:srgbClr val="0070C0"/>
-              </a:solidFill>
-              <a:latin typeface="Courier New" panose="02070309020205020404" pitchFamily="49" charset="0"/>
-              <a:cs typeface="Courier New" panose="02070309020205020404" pitchFamily="49" charset="0"/>
-            </a:endParaRPr>
-          </a:p>
-          <a:p>
-            <a:pPr marL="0" indent="0">
-              <a:buNone/>
-            </a:pPr>
-            <a:endParaRPr lang="en-US" b="1" dirty="0">
-              <a:solidFill>
-                <a:srgbClr val="0070C0"/>
-              </a:solidFill>
-              <a:latin typeface="Courier New" panose="02070309020205020404" pitchFamily="49" charset="0"/>
-              <a:cs typeface="Courier New" panose="02070309020205020404" pitchFamily="49" charset="0"/>
-            </a:endParaRPr>
-          </a:p>
-          <a:p>
-            <a:pPr marL="0" indent="0">
-              <a:buNone/>
-            </a:pPr>
             <a:endParaRPr lang="en-US" b="1" dirty="0">
               <a:solidFill>
                 <a:srgbClr val="0070C0"/>
@@ -6012,8 +5705,8 @@
         </p:blipFill>
         <p:spPr>
           <a:xfrm>
-            <a:off x="9417769" y="4089399"/>
-            <a:ext cx="2645307" cy="2531937"/>
+            <a:off x="7896240" y="2581421"/>
+            <a:ext cx="3158614" cy="3023245"/>
           </a:xfrm>
           <a:prstGeom prst="rect">
             <a:avLst/>
@@ -6151,33 +5844,15 @@
                                   </p:childTnLst>
                                 </p:cTn>
                               </p:par>
-                            </p:childTnLst>
-                          </p:cTn>
-                        </p:par>
-                      </p:childTnLst>
-                    </p:cTn>
-                  </p:par>
-                  <p:par>
-                    <p:cTn id="11" fill="hold">
-                      <p:stCondLst>
-                        <p:cond delay="indefinite"/>
-                      </p:stCondLst>
-                      <p:childTnLst>
-                        <p:par>
-                          <p:cTn id="12" fill="hold">
-                            <p:stCondLst>
-                              <p:cond delay="0"/>
-                            </p:stCondLst>
-                            <p:childTnLst>
                               <p:par>
-                                <p:cTn id="13" presetID="1" presetClass="entr" presetSubtype="0" fill="hold" grpId="0" nodeType="clickEffect">
+                                <p:cTn id="11" presetID="1" presetClass="entr" presetSubtype="0" fill="hold" grpId="0" nodeType="withEffect">
                                   <p:stCondLst>
                                     <p:cond delay="0"/>
                                   </p:stCondLst>
                                   <p:childTnLst>
                                     <p:set>
                                       <p:cBhvr>
-                                        <p:cTn id="14" dur="1" fill="hold">
+                                        <p:cTn id="12" dur="1" fill="hold">
                                           <p:stCondLst>
                                             <p:cond delay="0"/>
                                           </p:stCondLst>
@@ -6200,33 +5875,15 @@
                                   </p:childTnLst>
                                 </p:cTn>
                               </p:par>
-                            </p:childTnLst>
-                          </p:cTn>
-                        </p:par>
-                      </p:childTnLst>
-                    </p:cTn>
-                  </p:par>
-                  <p:par>
-                    <p:cTn id="15" fill="hold">
-                      <p:stCondLst>
-                        <p:cond delay="indefinite"/>
-                      </p:stCondLst>
-                      <p:childTnLst>
-                        <p:par>
-                          <p:cTn id="16" fill="hold">
-                            <p:stCondLst>
-                              <p:cond delay="0"/>
-                            </p:stCondLst>
-                            <p:childTnLst>
                               <p:par>
-                                <p:cTn id="17" presetID="1" presetClass="entr" presetSubtype="0" fill="hold" grpId="0" nodeType="clickEffect">
+                                <p:cTn id="13" presetID="1" presetClass="entr" presetSubtype="0" fill="hold" grpId="0" nodeType="withEffect">
                                   <p:stCondLst>
                                     <p:cond delay="0"/>
                                   </p:stCondLst>
                                   <p:childTnLst>
                                     <p:set>
                                       <p:cBhvr>
-                                        <p:cTn id="18" dur="1" fill="hold">
+                                        <p:cTn id="14" dur="1" fill="hold">
                                           <p:stCondLst>
                                             <p:cond delay="0"/>
                                           </p:stCondLst>
@@ -6250,14 +5907,45 @@
                                 </p:cTn>
                               </p:par>
                               <p:par>
-                                <p:cTn id="19" presetID="1" presetClass="entr" presetSubtype="0" fill="hold" nodeType="withEffect">
+                                <p:cTn id="15" presetID="1" presetClass="entr" presetSubtype="0" fill="hold" grpId="0" nodeType="withEffect">
                                   <p:stCondLst>
                                     <p:cond delay="0"/>
                                   </p:stCondLst>
                                   <p:childTnLst>
                                     <p:set>
                                       <p:cBhvr>
-                                        <p:cTn id="20" dur="1" fill="hold">
+                                        <p:cTn id="16" dur="1" fill="hold">
+                                          <p:stCondLst>
+                                            <p:cond delay="0"/>
+                                          </p:stCondLst>
+                                        </p:cTn>
+                                        <p:tgtEl>
+                                          <p:spTgt spid="3">
+                                            <p:txEl>
+                                              <p:pRg st="5" end="5"/>
+                                            </p:txEl>
+                                          </p:spTgt>
+                                        </p:tgtEl>
+                                        <p:attrNameLst>
+                                          <p:attrName>style.visibility</p:attrName>
+                                        </p:attrNameLst>
+                                      </p:cBhvr>
+                                      <p:to>
+                                        <p:strVal val="visible"/>
+                                      </p:to>
+                                    </p:set>
+                                  </p:childTnLst>
+                                </p:cTn>
+                              </p:par>
+                              <p:par>
+                                <p:cTn id="17" presetID="1" presetClass="entr" presetSubtype="0" fill="hold" nodeType="withEffect">
+                                  <p:stCondLst>
+                                    <p:cond delay="0"/>
+                                  </p:stCondLst>
+                                  <p:childTnLst>
+                                    <p:set>
+                                      <p:cBhvr>
+                                        <p:cTn id="18" dur="1" fill="hold">
                                           <p:stCondLst>
                                             <p:cond delay="0"/>
                                           </p:stCondLst>
@@ -6377,12 +6065,12 @@
         <p:spPr>
           <a:xfrm>
             <a:off x="1451577" y="1706813"/>
-            <a:ext cx="5863623" cy="4755771"/>
+            <a:ext cx="6600223" cy="4755771"/>
           </a:xfrm>
         </p:spPr>
         <p:txBody>
           <a:bodyPr>
-            <a:normAutofit fontScale="85000" lnSpcReduction="10000"/>
+            <a:normAutofit/>
           </a:bodyPr>
           <a:lstStyle/>
           <a:p>
@@ -6393,10 +6081,6 @@
               <a:rPr lang="en-CA" sz="2400" b="1" dirty="0"/>
               <a:t>Complex Regular Expressions Symbols</a:t>
             </a:r>
-            <a:br>
-              <a:rPr lang="en-CA" sz="2400" b="1" dirty="0"/>
-            </a:br>
-            <a:endParaRPr lang="en-CA" sz="1800" b="1" dirty="0"/>
           </a:p>
           <a:p>
             <a:pPr marL="0" indent="0">
@@ -6478,34 +6162,20 @@
             </a:r>
             <a:r>
               <a:rPr lang="en-US" b="1" dirty="0"/>
-              <a:t>opposite</a:t>
-            </a:r>
-            <a:br>
-              <a:rPr lang="en-US" b="1" dirty="0"/>
-            </a:br>
+              <a:t>opposite </a:t>
+            </a:r>
             <a:r>
               <a:rPr lang="en-US" dirty="0"/>
               <a:t>of the contents within the character class.</a:t>
             </a:r>
-            <a:br>
+          </a:p>
+          <a:p>
+            <a:pPr marL="0" indent="0">
+              <a:buNone/>
+            </a:pPr>
+            <a:r>
               <a:rPr lang="en-US" dirty="0"/>
-            </a:br>
-            <a:endParaRPr lang="en-US" dirty="0"/>
-          </a:p>
-          <a:p>
-            <a:pPr marL="0" indent="0">
-              <a:buNone/>
-            </a:pPr>
-            <a:r>
-              <a:rPr lang="en-US" dirty="0"/>
-              <a:t>This symbol (or sequence of these symbols) </a:t>
-            </a:r>
-            <a:br>
-              <a:rPr lang="en-US" dirty="0"/>
-            </a:br>
-            <a:r>
-              <a:rPr lang="en-US" dirty="0"/>
-              <a:t>are effective when used with </a:t>
+              <a:t>This symbol (or sequence of these symbols) are effective when used with </a:t>
             </a:r>
             <a:r>
               <a:rPr lang="en-US" b="1" dirty="0"/>
@@ -6515,10 +6185,6 @@
               <a:rPr lang="en-US" dirty="0"/>
               <a:t>.</a:t>
             </a:r>
-            <a:br>
-              <a:rPr lang="en-US" dirty="0"/>
-            </a:br>
-            <a:endParaRPr lang="en-US" dirty="0"/>
           </a:p>
           <a:p>
             <a:pPr marL="0" indent="0">
@@ -6528,20 +6194,12 @@
               <a:rPr lang="en-US" i="1" dirty="0"/>
               <a:t>Examples:</a:t>
             </a:r>
-            <a:r>
-              <a:rPr lang="en-US" dirty="0"/>
-              <a:t/>
-            </a:r>
-            <a:br>
-              <a:rPr lang="en-US" dirty="0"/>
-            </a:br>
-            <a:r>
-              <a:rPr lang="en-US" dirty="0"/>
-              <a:t/>
-            </a:r>
-            <a:br>
-              <a:rPr lang="en-US" dirty="0"/>
-            </a:br>
+            <a:endParaRPr lang="en-US" dirty="0"/>
+          </a:p>
+          <a:p>
+            <a:pPr marL="0" indent="0">
+              <a:buNone/>
+            </a:pPr>
             <a:r>
               <a:rPr lang="en-US" b="1" dirty="0">
                 <a:solidFill>
@@ -6561,16 +6219,6 @@
                 <a:cs typeface="Courier New" panose="02070309020205020404" pitchFamily="49" charset="0"/>
               </a:rPr>
               <a:t>data.txt</a:t>
-            </a:r>
-            <a:r>
-              <a:rPr lang="en-US" b="1" dirty="0">
-                <a:solidFill>
-                  <a:srgbClr val="0070C0"/>
-                </a:solidFill>
-                <a:latin typeface="Courier New" panose="02070309020205020404" pitchFamily="49" charset="0"/>
-                <a:cs typeface="Courier New" panose="02070309020205020404" pitchFamily="49" charset="0"/>
-              </a:rPr>
-              <a:t/>
             </a:r>
             <a:br>
               <a:rPr lang="en-US" b="1" dirty="0">
@@ -6653,7 +6301,7 @@
         </p:blipFill>
         <p:spPr>
           <a:xfrm>
-            <a:off x="8991599" y="3837466"/>
+            <a:off x="8470899" y="2116441"/>
             <a:ext cx="2955321" cy="2625118"/>
           </a:xfrm>
           <a:prstGeom prst="rect">
@@ -6939,15 +6587,64 @@
                                   </p:childTnLst>
                                 </p:cTn>
                               </p:par>
+                            </p:childTnLst>
+                          </p:cTn>
+                        </p:par>
+                      </p:childTnLst>
+                    </p:cTn>
+                  </p:par>
+                  <p:par>
+                    <p:cTn id="23" fill="hold">
+                      <p:stCondLst>
+                        <p:cond delay="indefinite"/>
+                      </p:stCondLst>
+                      <p:childTnLst>
+                        <p:par>
+                          <p:cTn id="24" fill="hold">
+                            <p:stCondLst>
+                              <p:cond delay="0"/>
+                            </p:stCondLst>
+                            <p:childTnLst>
                               <p:par>
-                                <p:cTn id="23" presetID="1" presetClass="entr" presetSubtype="0" fill="hold" nodeType="withEffect">
+                                <p:cTn id="25" presetID="1" presetClass="entr" presetSubtype="0" fill="hold" grpId="0" nodeType="clickEffect">
                                   <p:stCondLst>
                                     <p:cond delay="0"/>
                                   </p:stCondLst>
                                   <p:childTnLst>
                                     <p:set>
                                       <p:cBhvr>
-                                        <p:cTn id="24" dur="1" fill="hold">
+                                        <p:cTn id="26" dur="1" fill="hold">
+                                          <p:stCondLst>
+                                            <p:cond delay="0"/>
+                                          </p:stCondLst>
+                                        </p:cTn>
+                                        <p:tgtEl>
+                                          <p:spTgt spid="3">
+                                            <p:txEl>
+                                              <p:pRg st="6" end="6"/>
+                                            </p:txEl>
+                                          </p:spTgt>
+                                        </p:tgtEl>
+                                        <p:attrNameLst>
+                                          <p:attrName>style.visibility</p:attrName>
+                                        </p:attrNameLst>
+                                      </p:cBhvr>
+                                      <p:to>
+                                        <p:strVal val="visible"/>
+                                      </p:to>
+                                    </p:set>
+                                  </p:childTnLst>
+                                </p:cTn>
+                              </p:par>
+                              <p:par>
+                                <p:cTn id="27" presetID="1" presetClass="entr" presetSubtype="0" fill="hold" nodeType="withEffect">
+                                  <p:stCondLst>
+                                    <p:cond delay="0"/>
+                                  </p:stCondLst>
+                                  <p:childTnLst>
+                                    <p:set>
+                                      <p:cBhvr>
+                                        <p:cTn id="28" dur="1" fill="hold">
                                           <p:stCondLst>
                                             <p:cond delay="0"/>
                                           </p:stCondLst>
@@ -7066,13 +6763,13 @@
         </p:nvSpPr>
         <p:spPr>
           <a:xfrm>
-            <a:off x="1451577" y="1706813"/>
-            <a:ext cx="6337756" cy="4755771"/>
+            <a:off x="1451576" y="1706813"/>
+            <a:ext cx="6930423" cy="4755771"/>
           </a:xfrm>
         </p:spPr>
         <p:txBody>
           <a:bodyPr>
-            <a:normAutofit fontScale="77500" lnSpcReduction="20000"/>
+            <a:normAutofit lnSpcReduction="10000"/>
           </a:bodyPr>
           <a:lstStyle/>
           <a:p>
@@ -7083,10 +6780,6 @@
               <a:rPr lang="en-CA" sz="2400" b="1" dirty="0"/>
               <a:t>Complex Regular Expressions Symbols</a:t>
             </a:r>
-            <a:br>
-              <a:rPr lang="en-CA" sz="2400" b="1" dirty="0"/>
-            </a:br>
-            <a:endParaRPr lang="en-CA" sz="1800" b="1" dirty="0"/>
           </a:p>
           <a:p>
             <a:pPr marL="0" indent="0">
@@ -7106,13 +6799,6 @@
               </a:rPr>
               <a:t>*</a:t>
             </a:r>
-            <a:r>
-              <a:rPr lang="en-US" dirty="0"/>
-              <a:t/>
-            </a:r>
-            <a:br>
-              <a:rPr lang="en-US" dirty="0"/>
-            </a:br>
             <a:endParaRPr lang="en-US" dirty="0"/>
           </a:p>
           <a:p>
@@ -7131,9 +6817,6 @@
               <a:rPr lang="en-US" dirty="0"/>
               <a:t>of the </a:t>
             </a:r>
-            <a:br>
-              <a:rPr lang="en-US" dirty="0"/>
-            </a:br>
             <a:r>
               <a:rPr lang="en-US" b="1" dirty="0"/>
               <a:t>previous</a:t>
@@ -7142,10 +6825,6 @@
               <a:rPr lang="en-US" dirty="0"/>
               <a:t> character.</a:t>
             </a:r>
-            <a:br>
-              <a:rPr lang="en-US" dirty="0"/>
-            </a:br>
-            <a:endParaRPr lang="en-US" dirty="0"/>
           </a:p>
           <a:p>
             <a:pPr marL="0" indent="0">
@@ -7177,10 +6856,6 @@
               <a:rPr lang="en-US" dirty="0"/>
               <a:t> </a:t>
             </a:r>
-            <a:br>
-              <a:rPr lang="en-US" dirty="0"/>
-            </a:br>
-            <a:endParaRPr lang="en-US" dirty="0"/>
           </a:p>
           <a:p>
             <a:pPr marL="0" indent="0">
@@ -7190,14 +6865,6 @@
               <a:rPr lang="en-US" i="1" dirty="0"/>
               <a:t>Examples:</a:t>
             </a:r>
-            <a:r>
-              <a:rPr lang="en-US" b="1" dirty="0"/>
-              <a:t/>
-            </a:r>
-            <a:br>
-              <a:rPr lang="en-US" b="1" dirty="0"/>
-            </a:br>
-            <a:endParaRPr lang="en-US" b="1" dirty="0"/>
           </a:p>
           <a:p>
             <a:pPr marL="0" indent="0">
@@ -7242,16 +6909,6 @@
                 <a:cs typeface="Courier New" panose="02070309020205020404" pitchFamily="49" charset="0"/>
               </a:rPr>
               <a:t>data.txt</a:t>
-            </a:r>
-            <a:r>
-              <a:rPr lang="en-US" b="1" dirty="0">
-                <a:solidFill>
-                  <a:srgbClr val="0070C0"/>
-                </a:solidFill>
-                <a:latin typeface="Courier New" panose="02070309020205020404" pitchFamily="49" charset="0"/>
-                <a:cs typeface="Courier New" panose="02070309020205020404" pitchFamily="49" charset="0"/>
-              </a:rPr>
-              <a:t/>
             </a:r>
             <a:br>
               <a:rPr lang="en-US" b="1" dirty="0">
@@ -7281,16 +6938,6 @@
                 <a:cs typeface="Courier New" panose="02070309020205020404" pitchFamily="49" charset="0"/>
               </a:rPr>
               <a:t>data.txt</a:t>
-            </a:r>
-            <a:r>
-              <a:rPr lang="en-US" b="1" dirty="0">
-                <a:solidFill>
-                  <a:srgbClr val="0070C0"/>
-                </a:solidFill>
-                <a:latin typeface="Courier New" panose="02070309020205020404" pitchFamily="49" charset="0"/>
-                <a:cs typeface="Courier New" panose="02070309020205020404" pitchFamily="49" charset="0"/>
-              </a:rPr>
-              <a:t/>
             </a:r>
             <a:br>
               <a:rPr lang="en-US" b="1" dirty="0">
@@ -7353,8 +7000,8 @@
         </p:blipFill>
         <p:spPr>
           <a:xfrm>
-            <a:off x="9489641" y="3590888"/>
-            <a:ext cx="2501563" cy="3048780"/>
+            <a:off x="8610601" y="2194902"/>
+            <a:ext cx="3101204" cy="3779592"/>
           </a:xfrm>
           <a:prstGeom prst="rect">
             <a:avLst/>
@@ -7492,33 +7139,15 @@
                                   </p:childTnLst>
                                 </p:cTn>
                               </p:par>
-                            </p:childTnLst>
-                          </p:cTn>
-                        </p:par>
-                      </p:childTnLst>
-                    </p:cTn>
-                  </p:par>
-                  <p:par>
-                    <p:cTn id="11" fill="hold">
-                      <p:stCondLst>
-                        <p:cond delay="indefinite"/>
-                      </p:stCondLst>
-                      <p:childTnLst>
-                        <p:par>
-                          <p:cTn id="12" fill="hold">
-                            <p:stCondLst>
-                              <p:cond delay="0"/>
-                            </p:stCondLst>
-                            <p:childTnLst>
                               <p:par>
-                                <p:cTn id="13" presetID="1" presetClass="entr" presetSubtype="0" fill="hold" grpId="0" nodeType="clickEffect">
+                                <p:cTn id="11" presetID="1" presetClass="entr" presetSubtype="0" fill="hold" grpId="0" nodeType="withEffect">
                                   <p:stCondLst>
                                     <p:cond delay="0"/>
                                   </p:stCondLst>
                                   <p:childTnLst>
                                     <p:set>
                                       <p:cBhvr>
-                                        <p:cTn id="14" dur="1" fill="hold">
+                                        <p:cTn id="12" dur="1" fill="hold">
                                           <p:stCondLst>
                                             <p:cond delay="0"/>
                                           </p:stCondLst>
@@ -7541,33 +7170,15 @@
                                   </p:childTnLst>
                                 </p:cTn>
                               </p:par>
-                            </p:childTnLst>
-                          </p:cTn>
-                        </p:par>
-                      </p:childTnLst>
-                    </p:cTn>
-                  </p:par>
-                  <p:par>
-                    <p:cTn id="15" fill="hold">
-                      <p:stCondLst>
-                        <p:cond delay="indefinite"/>
-                      </p:stCondLst>
-                      <p:childTnLst>
-                        <p:par>
-                          <p:cTn id="16" fill="hold">
-                            <p:stCondLst>
-                              <p:cond delay="0"/>
-                            </p:stCondLst>
-                            <p:childTnLst>
                               <p:par>
-                                <p:cTn id="17" presetID="1" presetClass="entr" presetSubtype="0" fill="hold" grpId="0" nodeType="clickEffect">
+                                <p:cTn id="13" presetID="1" presetClass="entr" presetSubtype="0" fill="hold" grpId="0" nodeType="withEffect">
                                   <p:stCondLst>
                                     <p:cond delay="0"/>
                                   </p:stCondLst>
                                   <p:childTnLst>
                                     <p:set>
                                       <p:cBhvr>
-                                        <p:cTn id="18" dur="1" fill="hold">
+                                        <p:cTn id="14" dur="1" fill="hold">
                                           <p:stCondLst>
                                             <p:cond delay="0"/>
                                           </p:stCondLst>
@@ -7591,14 +7202,14 @@
                                 </p:cTn>
                               </p:par>
                               <p:par>
-                                <p:cTn id="19" presetID="1" presetClass="entr" presetSubtype="0" fill="hold" grpId="0" nodeType="withEffect">
+                                <p:cTn id="15" presetID="1" presetClass="entr" presetSubtype="0" fill="hold" grpId="0" nodeType="withEffect">
                                   <p:stCondLst>
                                     <p:cond delay="0"/>
                                   </p:stCondLst>
                                   <p:childTnLst>
                                     <p:set>
                                       <p:cBhvr>
-                                        <p:cTn id="20" dur="1" fill="hold">
+                                        <p:cTn id="16" dur="1" fill="hold">
                                           <p:stCondLst>
                                             <p:cond delay="0"/>
                                           </p:stCondLst>
@@ -7622,14 +7233,14 @@
                                 </p:cTn>
                               </p:par>
                               <p:par>
-                                <p:cTn id="21" presetID="1" presetClass="entr" presetSubtype="0" fill="hold" nodeType="withEffect">
+                                <p:cTn id="17" presetID="1" presetClass="entr" presetSubtype="0" fill="hold" nodeType="withEffect">
                                   <p:stCondLst>
                                     <p:cond delay="0"/>
                                   </p:stCondLst>
                                   <p:childTnLst>
                                     <p:set>
                                       <p:cBhvr>
-                                        <p:cTn id="22" dur="1" fill="hold">
+                                        <p:cTn id="18" dur="1" fill="hold">
                                           <p:stCondLst>
                                             <p:cond delay="0"/>
                                           </p:stCondLst>
@@ -7794,17 +7405,9 @@
             <a:br>
               <a:rPr lang="en-US" dirty="0"/>
             </a:br>
-            <a:r>
-              <a:rPr lang="en-US" dirty="0"/>
-              <a:t/>
-            </a:r>
             <a:br>
               <a:rPr lang="en-US" dirty="0"/>
             </a:br>
-            <a:r>
-              <a:rPr lang="en-US" dirty="0"/>
-              <a:t/>
-            </a:r>
             <a:br>
               <a:rPr lang="en-US" dirty="0"/>
             </a:br>
@@ -7814,59 +7417,27 @@
             <a:pPr marL="0" indent="0">
               <a:buNone/>
             </a:pPr>
-            <a:r>
-              <a:rPr lang="en-US" dirty="0"/>
-              <a:t/>
-            </a:r>
             <a:br>
               <a:rPr lang="en-US" dirty="0"/>
             </a:br>
-            <a:r>
-              <a:rPr lang="en-US" dirty="0"/>
-              <a:t/>
-            </a:r>
             <a:br>
               <a:rPr lang="en-US" dirty="0"/>
             </a:br>
-            <a:r>
-              <a:rPr lang="en-US" dirty="0"/>
-              <a:t/>
-            </a:r>
             <a:br>
               <a:rPr lang="en-US" dirty="0"/>
             </a:br>
-            <a:r>
-              <a:rPr lang="en-US" dirty="0"/>
-              <a:t/>
-            </a:r>
             <a:br>
               <a:rPr lang="en-US" dirty="0"/>
             </a:br>
-            <a:r>
-              <a:rPr lang="en-US" dirty="0"/>
-              <a:t/>
-            </a:r>
             <a:br>
               <a:rPr lang="en-US" dirty="0"/>
             </a:br>
-            <a:r>
-              <a:rPr lang="en-US" dirty="0"/>
-              <a:t/>
-            </a:r>
             <a:br>
               <a:rPr lang="en-US" dirty="0"/>
             </a:br>
-            <a:r>
-              <a:rPr lang="en-US" dirty="0"/>
-              <a:t/>
-            </a:r>
             <a:br>
               <a:rPr lang="en-US" dirty="0"/>
             </a:br>
-            <a:r>
-              <a:rPr lang="en-US" dirty="0"/>
-              <a:t/>
-            </a:r>
             <a:br>
               <a:rPr lang="en-US" dirty="0"/>
             </a:br>
@@ -7898,7 +7469,7 @@
           <a:blip r:embed="rId2">
             <a:extLst>
               <a:ext uri="{837473B0-CC2E-450A-ABE3-18F120FF3D39}">
-                <a1611:picAttrSrcUrl xmlns:a1611="http://schemas.microsoft.com/office/drawing/2016/11/main" xmlns="" r:id="rId3"/>
+                <a1611:picAttrSrcUrl xmlns:a1611="http://schemas.microsoft.com/office/drawing/2016/11/main" r:id="rId3"/>
               </a:ext>
             </a:extLst>
           </a:blip>
@@ -8148,7 +7719,7 @@
         </p:spPr>
         <p:txBody>
           <a:bodyPr>
-            <a:normAutofit fontScale="85000" lnSpcReduction="20000"/>
+            <a:normAutofit/>
           </a:bodyPr>
           <a:lstStyle/>
           <a:p>
@@ -8159,13 +7730,6 @@
               <a:rPr lang="en-CA" sz="2400" b="1" dirty="0"/>
               <a:t>Tip:  Creating a Reference Sheet</a:t>
             </a:r>
-            <a:r>
-              <a:rPr lang="en-CA" b="1" dirty="0"/>
-              <a:t/>
-            </a:r>
-            <a:br>
-              <a:rPr lang="en-CA" b="1" dirty="0"/>
-            </a:br>
             <a:endParaRPr lang="en-CA" b="1" dirty="0"/>
           </a:p>
           <a:p>
@@ -8174,14 +7738,7 @@
             </a:pPr>
             <a:r>
               <a:rPr lang="en-CA" dirty="0"/>
-              <a:t>It is a good idea to keep symbols for Filename Expansion</a:t>
-            </a:r>
-            <a:br>
-              <a:rPr lang="en-CA" dirty="0"/>
-            </a:br>
-            <a:r>
-              <a:rPr lang="en-CA" dirty="0"/>
-              <a:t>and Regular Expressions </a:t>
+              <a:t>It is a good idea to keep symbols for Filename Expansion and Regular Expressions </a:t>
             </a:r>
             <a:r>
               <a:rPr lang="en-CA" b="1" dirty="0"/>
@@ -8191,25 +7748,14 @@
               <a:rPr lang="en-CA" dirty="0"/>
               <a:t> since there is some overlapping similar symbols that have different purposes.</a:t>
             </a:r>
-            <a:br>
+          </a:p>
+          <a:p>
+            <a:pPr marL="0" indent="0">
+              <a:buNone/>
+            </a:pPr>
+            <a:r>
               <a:rPr lang="en-CA" dirty="0"/>
-            </a:br>
-            <a:endParaRPr lang="en-CA" dirty="0"/>
-          </a:p>
-          <a:p>
-            <a:pPr marL="0" indent="0">
-              <a:buNone/>
-            </a:pPr>
-            <a:r>
-              <a:rPr lang="en-CA" dirty="0"/>
-              <a:t>It is recommended to write-out these separate </a:t>
-            </a:r>
-            <a:br>
-              <a:rPr lang="en-CA" dirty="0"/>
-            </a:br>
-            <a:r>
-              <a:rPr lang="en-CA" dirty="0"/>
-              <a:t>set of symbols on a </a:t>
+              <a:t>It is recommended to write-out these separate set of symbols on a </a:t>
             </a:r>
             <a:r>
               <a:rPr lang="en-CA" b="1" dirty="0"/>
@@ -8219,59 +7765,6 @@
               <a:rPr lang="en-CA" dirty="0"/>
               <a:t>for reference.</a:t>
             </a:r>
-            <a:br>
-              <a:rPr lang="en-CA" dirty="0"/>
-            </a:br>
-            <a:r>
-              <a:rPr lang="en-CA" dirty="0"/>
-              <a:t/>
-            </a:r>
-            <a:br>
-              <a:rPr lang="en-CA" dirty="0"/>
-            </a:br>
-            <a:r>
-              <a:rPr lang="en-CA" dirty="0"/>
-              <a:t/>
-            </a:r>
-            <a:br>
-              <a:rPr lang="en-CA" dirty="0"/>
-            </a:br>
-            <a:r>
-              <a:rPr lang="en-CA" dirty="0"/>
-              <a:t/>
-            </a:r>
-            <a:br>
-              <a:rPr lang="en-CA" dirty="0"/>
-            </a:br>
-            <a:r>
-              <a:rPr lang="en-CA" dirty="0"/>
-              <a:t/>
-            </a:r>
-            <a:br>
-              <a:rPr lang="en-CA" dirty="0"/>
-            </a:br>
-            <a:r>
-              <a:rPr lang="en-CA" dirty="0"/>
-              <a:t/>
-            </a:r>
-            <a:br>
-              <a:rPr lang="en-CA" dirty="0"/>
-            </a:br>
-            <a:r>
-              <a:rPr lang="en-CA" dirty="0"/>
-              <a:t/>
-            </a:r>
-            <a:br>
-              <a:rPr lang="en-CA" dirty="0"/>
-            </a:br>
-            <a:r>
-              <a:rPr lang="en-CA" dirty="0"/>
-              <a:t/>
-            </a:r>
-            <a:br>
-              <a:rPr lang="en-CA" dirty="0"/>
-            </a:br>
-            <a:endParaRPr lang="en-CA" dirty="0"/>
           </a:p>
         </p:txBody>
       </p:sp>
@@ -8297,7 +7790,7 @@
         </p:blipFill>
         <p:spPr>
           <a:xfrm>
-            <a:off x="8305212" y="671837"/>
+            <a:off x="8087356" y="1053241"/>
             <a:ext cx="3688278" cy="2069952"/>
           </a:xfrm>
           <a:prstGeom prst="rect">
@@ -8332,7 +7825,7 @@
         </p:blipFill>
         <p:spPr>
           <a:xfrm>
-            <a:off x="8315956" y="3140948"/>
+            <a:off x="8087356" y="3429000"/>
             <a:ext cx="3677534" cy="2912533"/>
           </a:xfrm>
           <a:prstGeom prst="rect">
@@ -8600,7 +8093,7 @@
           <a:lstStyle/>
           <a:p>
             <a:r>
-              <a:rPr lang="en-US" sz="2800" dirty="0" smtClean="0"/>
+              <a:rPr lang="en-US" sz="2800" dirty="0"/>
               <a:t>HOMEWORK</a:t>
             </a:r>
             <a:endParaRPr lang="en-US" sz="3000" dirty="0"/>
@@ -8649,30 +8142,14 @@
             </a:pPr>
             <a:r>
               <a:rPr lang="en-CA" dirty="0"/>
-              <a:t>P</a:t>
-            </a:r>
-            <a:r>
-              <a:rPr lang="en-CA" dirty="0" smtClean="0"/>
-              <a:t>erform </a:t>
+              <a:t>Perform </a:t>
             </a:r>
             <a:r>
               <a:rPr lang="en-CA" b="1" dirty="0"/>
-              <a:t>Week </a:t>
-            </a:r>
-            <a:r>
-              <a:rPr lang="en-CA" b="1" dirty="0" smtClean="0"/>
-              <a:t>9  </a:t>
-            </a:r>
-            <a:r>
+              <a:t>Week 9  Tutorial:</a:t>
+            </a:r>
+            <a:br>
               <a:rPr lang="en-CA" b="1" dirty="0"/>
-              <a:t>Tutorial</a:t>
-            </a:r>
-            <a:r>
-              <a:rPr lang="en-CA" b="1" dirty="0" smtClean="0"/>
-              <a:t>:</a:t>
-            </a:r>
-            <a:br>
-              <a:rPr lang="en-CA" b="1" dirty="0" smtClean="0"/>
             </a:br>
             <a:r>
               <a:rPr lang="en-US" sz="1600" b="1" spc="-1" dirty="0">
@@ -8680,23 +8157,7 @@
                   <a:srgbClr val="000000"/>
                 </a:solidFill>
               </a:rPr>
-              <a:t>(Due: Friday Week </a:t>
-            </a:r>
-            <a:r>
-              <a:rPr lang="en-US" sz="1600" b="1" spc="-1" dirty="0" smtClean="0">
-                <a:solidFill>
-                  <a:srgbClr val="000000"/>
-                </a:solidFill>
-              </a:rPr>
-              <a:t>10 </a:t>
-            </a:r>
-            <a:r>
-              <a:rPr lang="en-US" sz="1600" b="1" spc="-1" dirty="0">
-                <a:solidFill>
-                  <a:srgbClr val="000000"/>
-                </a:solidFill>
-              </a:rPr>
-              <a:t>@ midnight for a 2% grade)</a:t>
+              <a:t>(Due: Friday Week 10 @ midnight for a 2% grade)</a:t>
             </a:r>
             <a:r>
               <a:rPr lang="en-US" sz="1600" spc="-1" dirty="0">
@@ -8706,10 +8167,6 @@
               </a:rPr>
               <a:t>:</a:t>
             </a:r>
-            <a:r>
-              <a:rPr lang="en-CA" sz="1600" b="1" dirty="0"/>
-              <a:t/>
-            </a:r>
             <a:br>
               <a:rPr lang="en-CA" sz="1600" b="1" dirty="0"/>
             </a:br>
@@ -8723,10 +8180,6 @@
               </a:rPr>
               <a:t>INVESTIGATION 1: SIMPLE &amp; COMPLEX REGULAR EXPRESSIONS</a:t>
             </a:r>
-            <a:r>
-              <a:rPr lang="en-CA" dirty="0"/>
-              <a:t/>
-            </a:r>
             <a:br>
               <a:rPr lang="en-CA" dirty="0"/>
             </a:br>
@@ -8784,22 +8237,9 @@
               <a:t> B</a:t>
             </a:r>
             <a:r>
-              <a:rPr lang="en-US" sz="2000" dirty="0" smtClean="0"/>
+              <a:rPr lang="en-US" sz="2000" dirty="0"/>
               <a:t>)</a:t>
             </a:r>
-            <a:r>
-              <a:rPr lang="en-CA" sz="1600" dirty="0"/>
-              <a:t/>
-            </a:r>
-            <a:br>
-              <a:rPr lang="en-CA" sz="1600" dirty="0"/>
-            </a:br>
-            <a:endParaRPr lang="en-CA" sz="1600" dirty="0"/>
-          </a:p>
-          <a:p>
-            <a:endParaRPr lang="en-CA" sz="2400" dirty="0"/>
-          </a:p>
-          <a:p>
             <a:endParaRPr lang="en-CA" sz="2400" dirty="0"/>
           </a:p>
           <a:p>
@@ -9127,10 +8567,6 @@
               <a:rPr lang="en-US" i="1" dirty="0"/>
               <a:t>Filename Expansion</a:t>
             </a:r>
-            <a:r>
-              <a:rPr lang="en-US" dirty="0"/>
-              <a:t/>
-            </a:r>
             <a:br>
               <a:rPr lang="en-US" dirty="0"/>
             </a:br>
@@ -9202,13 +8638,8 @@
             </a:pPr>
             <a:r>
               <a:rPr lang="en-US" b="1" dirty="0"/>
-              <a:t>Perform Week 9</a:t>
-            </a:r>
-            <a:r>
-              <a:rPr lang="en-US" b="1" dirty="0" smtClean="0"/>
-              <a:t>  Tutorial</a:t>
-            </a:r>
-            <a:endParaRPr lang="en-US" b="1" dirty="0"/>
+              <a:t>Perform Week 9  Tutorial</a:t>
+            </a:r>
           </a:p>
           <a:p>
             <a:pPr lvl="1"/>
@@ -9759,10 +9190,6 @@
               <a:rPr lang="en-CA" sz="2400" b="1" dirty="0"/>
               <a:t>Definition</a:t>
             </a:r>
-            <a:r>
-              <a:rPr lang="en-CA" b="1" dirty="0"/>
-              <a:t/>
-            </a:r>
             <a:br>
               <a:rPr lang="en-CA" b="1" dirty="0"/>
             </a:br>
@@ -9828,10 +9255,6 @@
             <a:pPr marL="0" indent="0">
               <a:buNone/>
             </a:pPr>
-            <a:r>
-              <a:rPr lang="en-US" dirty="0"/>
-              <a:t/>
-            </a:r>
             <a:br>
               <a:rPr lang="en-US" dirty="0"/>
             </a:br>
@@ -9845,59 +9268,27 @@
               </a:rPr>
               <a:t>https://en.wikipedia.org/wiki/Regular_expression</a:t>
             </a:r>
-            <a:r>
-              <a:rPr lang="en-CA" dirty="0"/>
-              <a:t/>
-            </a:r>
             <a:br>
               <a:rPr lang="en-CA" dirty="0"/>
             </a:br>
-            <a:r>
-              <a:rPr lang="en-CA" dirty="0"/>
-              <a:t/>
-            </a:r>
             <a:br>
               <a:rPr lang="en-CA" dirty="0"/>
             </a:br>
-            <a:r>
-              <a:rPr lang="en-CA" dirty="0"/>
-              <a:t/>
-            </a:r>
             <a:br>
               <a:rPr lang="en-CA" dirty="0"/>
             </a:br>
-            <a:r>
-              <a:rPr lang="en-CA" dirty="0"/>
-              <a:t/>
-            </a:r>
             <a:br>
               <a:rPr lang="en-CA" dirty="0"/>
             </a:br>
-            <a:r>
-              <a:rPr lang="en-CA" dirty="0"/>
-              <a:t/>
-            </a:r>
             <a:br>
               <a:rPr lang="en-CA" dirty="0"/>
             </a:br>
-            <a:r>
-              <a:rPr lang="en-CA" dirty="0"/>
-              <a:t/>
-            </a:r>
             <a:br>
               <a:rPr lang="en-CA" dirty="0"/>
             </a:br>
-            <a:r>
-              <a:rPr lang="en-CA" dirty="0"/>
-              <a:t/>
-            </a:r>
             <a:br>
               <a:rPr lang="en-CA" dirty="0"/>
             </a:br>
-            <a:r>
-              <a:rPr lang="en-CA" dirty="0"/>
-              <a:t/>
-            </a:r>
             <a:br>
               <a:rPr lang="en-CA" dirty="0"/>
             </a:br>
@@ -9923,7 +9314,7 @@
           <a:blip r:embed="rId3">
             <a:extLst>
               <a:ext uri="{837473B0-CC2E-450A-ABE3-18F120FF3D39}">
-                <a1611:picAttrSrcUrl xmlns:a1611="http://schemas.microsoft.com/office/drawing/2016/11/main" xmlns="" r:id="rId4"/>
+                <a1611:picAttrSrcUrl xmlns:a1611="http://schemas.microsoft.com/office/drawing/2016/11/main" r:id="rId4"/>
               </a:ext>
             </a:extLst>
           </a:blip>
@@ -9951,13 +9342,6 @@
   <p:clrMapOvr>
     <a:masterClrMapping/>
   </p:clrMapOvr>
-  <p:timing>
-    <p:tnLst>
-      <p:par>
-        <p:cTn id="1" dur="indefinite" restart="never" nodeType="tmRoot"/>
-      </p:par>
-    </p:tnLst>
-  </p:timing>
 </p:sld>
 </file>
 
@@ -10028,12 +9412,12 @@
         <p:spPr>
           <a:xfrm>
             <a:off x="1451577" y="1706813"/>
-            <a:ext cx="5432951" cy="4755771"/>
+            <a:ext cx="5469923" cy="4755771"/>
           </a:xfrm>
         </p:spPr>
         <p:txBody>
           <a:bodyPr>
-            <a:normAutofit fontScale="85000" lnSpcReduction="10000"/>
+            <a:normAutofit/>
           </a:bodyPr>
           <a:lstStyle/>
           <a:p>
@@ -10044,13 +9428,6 @@
               <a:rPr lang="en-CA" sz="2400" b="1" dirty="0"/>
               <a:t>Regular Expressions vs Filename Expansion</a:t>
             </a:r>
-            <a:r>
-              <a:rPr lang="en-CA" b="1" dirty="0"/>
-              <a:t/>
-            </a:r>
-            <a:br>
-              <a:rPr lang="en-CA" b="1" dirty="0"/>
-            </a:br>
             <a:endParaRPr lang="en-CA" b="1" dirty="0"/>
           </a:p>
           <a:p>
@@ -10096,59 +9473,48 @@
             <a:r>
               <a:rPr lang="en-US" b="1" dirty="0"/>
               <a:t> </a:t>
+            </a:r>
+            <a:r>
+              <a:rPr lang="en-US" dirty="0"/>
+              <a:t>as </a:t>
+            </a:r>
+            <a:r>
+              <a:rPr lang="en-US" b="1" dirty="0"/>
+              <a:t>arguments</a:t>
+            </a:r>
+            <a:r>
+              <a:rPr lang="en-US" dirty="0"/>
+              <a:t> (referred to as “</a:t>
+            </a:r>
+            <a:r>
+              <a:rPr lang="en-US" i="1" dirty="0" err="1"/>
+              <a:t>globbing</a:t>
+            </a:r>
+            <a:r>
+              <a:rPr lang="en-US" dirty="0"/>
+              <a:t>”).</a:t>
+            </a:r>
+          </a:p>
+          <a:p>
+            <a:pPr marL="0" indent="0">
+              <a:buNone/>
+            </a:pPr>
+            <a:r>
+              <a:rPr lang="en-US" dirty="0"/>
+              <a:t>This is used for command </a:t>
+            </a:r>
+            <a:r>
+              <a:rPr lang="en-US" b="1" dirty="0"/>
+              <a:t>file management </a:t>
+            </a:r>
+            <a:r>
+              <a:rPr lang="en-US" dirty="0"/>
+              <a:t>and</a:t>
             </a:r>
             <a:br>
               <a:rPr lang="en-US" b="1" dirty="0"/>
             </a:br>
             <a:r>
-              <a:rPr lang="en-US" dirty="0"/>
-              <a:t>as </a:t>
-            </a:r>
-            <a:r>
-              <a:rPr lang="en-US" b="1" dirty="0"/>
-              <a:t>arguments</a:t>
-            </a:r>
-            <a:r>
-              <a:rPr lang="en-US" dirty="0"/>
-              <a:t> (referred to as “</a:t>
-            </a:r>
-            <a:r>
-              <a:rPr lang="en-US" i="1" dirty="0" err="1"/>
-              <a:t>globbing</a:t>
-            </a:r>
-            <a:r>
-              <a:rPr lang="en-US" dirty="0"/>
-              <a:t>”).</a:t>
-            </a:r>
-            <a:br>
-              <a:rPr lang="en-US" dirty="0"/>
-            </a:br>
-            <a:endParaRPr lang="en-US" dirty="0"/>
-          </a:p>
-          <a:p>
-            <a:pPr marL="0" indent="0">
-              <a:buNone/>
-            </a:pPr>
-            <a:r>
-              <a:rPr lang="en-US" dirty="0"/>
-              <a:t>This is used for command </a:t>
-            </a:r>
-            <a:r>
-              <a:rPr lang="en-US" b="1" dirty="0"/>
-              <a:t>file management </a:t>
-            </a:r>
-            <a:r>
-              <a:rPr lang="en-US" dirty="0"/>
-              <a:t>and</a:t>
-            </a:r>
-            <a:r>
-              <a:rPr lang="en-US" b="1" dirty="0"/>
-              <a:t/>
-            </a:r>
-            <a:br>
-              <a:rPr lang="en-US" b="1" dirty="0"/>
-            </a:br>
-            <a:r>
               <a:rPr lang="en-US" b="1" dirty="0"/>
               <a:t>file manipulation commands </a:t>
             </a:r>
@@ -10156,9 +9522,11 @@
               <a:rPr lang="en-US" dirty="0"/>
               <a:t>including:  </a:t>
             </a:r>
-            <a:br>
-              <a:rPr lang="en-US" dirty="0"/>
-            </a:br>
+          </a:p>
+          <a:p>
+            <a:pPr marL="0" indent="0">
+              <a:buNone/>
+            </a:pPr>
             <a:r>
               <a:rPr lang="en-US" b="1" dirty="0">
                 <a:solidFill>
@@ -10468,34 +9836,7 @@
               <a:rPr lang="en-US" b="1" dirty="0"/>
               <a:t> </a:t>
             </a:r>
-            <a:r>
-              <a:rPr lang="en-US" dirty="0"/>
-              <a:t/>
-            </a:r>
-            <a:br>
-              <a:rPr lang="en-US" dirty="0"/>
-            </a:br>
             <a:endParaRPr lang="en-US" dirty="0"/>
-          </a:p>
-          <a:p>
-            <a:pPr marL="0" indent="0">
-              <a:buNone/>
-            </a:pPr>
-            <a:r>
-              <a:rPr lang="en-US" dirty="0"/>
-              <a:t/>
-            </a:r>
-            <a:br>
-              <a:rPr lang="en-US" dirty="0"/>
-            </a:br>
-            <a:r>
-              <a:rPr lang="en-US" dirty="0"/>
-              <a:t/>
-            </a:r>
-            <a:br>
-              <a:rPr lang="en-US" dirty="0"/>
-            </a:br>
-            <a:endParaRPr lang="en-CA" dirty="0"/>
           </a:p>
         </p:txBody>
       </p:sp>
@@ -10521,7 +9862,7 @@
         </p:blipFill>
         <p:spPr>
           <a:xfrm>
-            <a:off x="7298934" y="2526434"/>
+            <a:off x="7184634" y="3358248"/>
             <a:ext cx="4754949" cy="1452900"/>
           </a:xfrm>
           <a:prstGeom prst="rect">
@@ -10552,7 +9893,7 @@
           <a:blip r:embed="rId4">
             <a:extLst>
               <a:ext uri="{837473B0-CC2E-450A-ABE3-18F120FF3D39}">
-                <a1611:picAttrSrcUrl xmlns:a1611="http://schemas.microsoft.com/office/drawing/2016/11/main" xmlns="" r:id="rId5"/>
+                <a1611:picAttrSrcUrl xmlns:a1611="http://schemas.microsoft.com/office/drawing/2016/11/main" r:id="rId5"/>
               </a:ext>
             </a:extLst>
           </a:blip>
@@ -10665,26 +10006,39 @@
                                   </p:childTnLst>
                                 </p:cTn>
                               </p:par>
-                            </p:childTnLst>
-                          </p:cTn>
-                        </p:par>
-                      </p:childTnLst>
-                    </p:cTn>
-                  </p:par>
-                  <p:par>
-                    <p:cTn id="9" fill="hold">
-                      <p:stCondLst>
-                        <p:cond delay="indefinite"/>
-                      </p:stCondLst>
-                      <p:childTnLst>
-                        <p:par>
-                          <p:cTn id="10" fill="hold">
-                            <p:stCondLst>
-                              <p:cond delay="0"/>
-                            </p:stCondLst>
-                            <p:childTnLst>
                               <p:par>
-                                <p:cTn id="11" presetID="1" presetClass="entr" presetSubtype="0" fill="hold" grpId="0" nodeType="clickEffect">
+                                <p:cTn id="9" presetID="1" presetClass="entr" presetSubtype="0" fill="hold" grpId="0" nodeType="withEffect">
+                                  <p:stCondLst>
+                                    <p:cond delay="0"/>
+                                  </p:stCondLst>
+                                  <p:childTnLst>
+                                    <p:set>
+                                      <p:cBhvr>
+                                        <p:cTn id="10" dur="1" fill="hold">
+                                          <p:stCondLst>
+                                            <p:cond delay="0"/>
+                                          </p:stCondLst>
+                                        </p:cTn>
+                                        <p:tgtEl>
+                                          <p:spTgt spid="3">
+                                            <p:txEl>
+                                              <p:pRg st="2" end="2"/>
+                                            </p:txEl>
+                                          </p:spTgt>
+                                        </p:tgtEl>
+                                        <p:attrNameLst>
+                                          <p:attrName>style.visibility</p:attrName>
+                                        </p:attrNameLst>
+                                      </p:cBhvr>
+                                      <p:to>
+                                        <p:strVal val="visible"/>
+                                      </p:to>
+                                    </p:set>
+                                  </p:childTnLst>
+                                </p:cTn>
+                              </p:par>
+                              <p:par>
+                                <p:cTn id="11" presetID="1" presetClass="entr" presetSubtype="0" fill="hold" grpId="0" nodeType="withEffect">
                                   <p:stCondLst>
                                     <p:cond delay="0"/>
                                   </p:stCondLst>
@@ -10699,7 +10053,7 @@
                                         <p:tgtEl>
                                           <p:spTgt spid="3">
                                             <p:txEl>
-                                              <p:pRg st="2" end="2"/>
+                                              <p:pRg st="3" end="3"/>
                                             </p:txEl>
                                           </p:spTgt>
                                         </p:tgtEl>
@@ -10820,7 +10174,7 @@
         </p:spPr>
         <p:txBody>
           <a:bodyPr>
-            <a:normAutofit fontScale="92500" lnSpcReduction="20000"/>
+            <a:normAutofit/>
           </a:bodyPr>
           <a:lstStyle/>
           <a:p>
@@ -10831,13 +10185,6 @@
               <a:rPr lang="en-CA" sz="2400" b="1" dirty="0"/>
               <a:t>Regular Expressions vs Filename Expansion</a:t>
             </a:r>
-            <a:r>
-              <a:rPr lang="en-CA" b="1" dirty="0"/>
-              <a:t/>
-            </a:r>
-            <a:br>
-              <a:rPr lang="en-CA" b="1" dirty="0"/>
-            </a:br>
             <a:endParaRPr lang="en-CA" b="1" dirty="0"/>
           </a:p>
           <a:p>
@@ -10882,14 +10229,7 @@
             </a:r>
             <a:r>
               <a:rPr lang="en-CA" dirty="0"/>
-              <a:t>. </a:t>
-            </a:r>
-            <a:br>
-              <a:rPr lang="en-CA" dirty="0"/>
-            </a:br>
-            <a:r>
-              <a:rPr lang="en-CA" dirty="0"/>
-              <a:t>This can represent text </a:t>
+              <a:t>.  This can represent text </a:t>
             </a:r>
             <a:r>
               <a:rPr lang="en-CA" u="sng" dirty="0"/>
@@ -10923,13 +10263,6 @@
               <a:rPr lang="en-CA" dirty="0"/>
               <a:t>.</a:t>
             </a:r>
-            <a:r>
-              <a:rPr lang="en-CA" i="1" dirty="0"/>
-              <a:t/>
-            </a:r>
-            <a:br>
-              <a:rPr lang="en-CA" i="1" dirty="0"/>
-            </a:br>
             <a:endParaRPr lang="en-CA" i="1" dirty="0"/>
           </a:p>
           <a:p>
@@ -10938,8 +10271,13 @@
             </a:pPr>
             <a:r>
               <a:rPr lang="en-US" dirty="0"/>
-              <a:t>Regular expressions are used with commands that match patterns contained in text such as:  </a:t>
-            </a:r>
+              <a:t>Regular expressions are used with commands that match patterns contained in text such as:</a:t>
+            </a:r>
+          </a:p>
+          <a:p>
+            <a:pPr marL="0" indent="0">
+              <a:buNone/>
+            </a:pPr>
             <a:r>
               <a:rPr lang="en-US" b="1" dirty="0">
                 <a:solidFill>
@@ -10948,7 +10286,7 @@
                 <a:latin typeface="Courier New" panose="02070309020205020404" pitchFamily="49" charset="0"/>
                 <a:cs typeface="Courier New" panose="02070309020205020404" pitchFamily="49" charset="0"/>
               </a:rPr>
-              <a:t>grep </a:t>
+              <a:t>grep</a:t>
             </a:r>
             <a:r>
               <a:rPr lang="en-US" dirty="0">
@@ -11070,65 +10408,6 @@
               </a:rPr>
               <a:t>awk</a:t>
             </a:r>
-            <a:r>
-              <a:rPr lang="en-US" b="1" dirty="0"/>
-              <a:t> </a:t>
-            </a:r>
-            <a:r>
-              <a:rPr lang="en-CA" i="1" dirty="0">
-                <a:latin typeface="Courier New" panose="02070309020205020404" pitchFamily="49" charset="0"/>
-                <a:cs typeface="Courier New" panose="02070309020205020404" pitchFamily="49" charset="0"/>
-              </a:rPr>
-              <a:t/>
-            </a:r>
-            <a:br>
-              <a:rPr lang="en-CA" i="1" dirty="0">
-                <a:latin typeface="Courier New" panose="02070309020205020404" pitchFamily="49" charset="0"/>
-                <a:cs typeface="Courier New" panose="02070309020205020404" pitchFamily="49" charset="0"/>
-              </a:rPr>
-            </a:br>
-            <a:r>
-              <a:rPr lang="en-CA" dirty="0"/>
-              <a:t/>
-            </a:r>
-            <a:br>
-              <a:rPr lang="en-CA" dirty="0"/>
-            </a:br>
-            <a:r>
-              <a:rPr lang="en-CA" dirty="0"/>
-              <a:t/>
-            </a:r>
-            <a:br>
-              <a:rPr lang="en-CA" dirty="0"/>
-            </a:br>
-            <a:r>
-              <a:rPr lang="en-CA" dirty="0"/>
-              <a:t/>
-            </a:r>
-            <a:br>
-              <a:rPr lang="en-CA" dirty="0"/>
-            </a:br>
-            <a:r>
-              <a:rPr lang="en-CA" dirty="0"/>
-              <a:t/>
-            </a:r>
-            <a:br>
-              <a:rPr lang="en-CA" dirty="0"/>
-            </a:br>
-            <a:r>
-              <a:rPr lang="en-CA" dirty="0"/>
-              <a:t/>
-            </a:r>
-            <a:br>
-              <a:rPr lang="en-CA" dirty="0"/>
-            </a:br>
-            <a:r>
-              <a:rPr lang="en-CA" dirty="0"/>
-              <a:t/>
-            </a:r>
-            <a:br>
-              <a:rPr lang="en-CA" dirty="0"/>
-            </a:br>
             <a:endParaRPr lang="en-CA" dirty="0"/>
           </a:p>
         </p:txBody>
@@ -11151,7 +10430,7 @@
           <a:blip r:embed="rId2">
             <a:extLst>
               <a:ext uri="{837473B0-CC2E-450A-ABE3-18F120FF3D39}">
-                <a1611:picAttrSrcUrl xmlns:a1611="http://schemas.microsoft.com/office/drawing/2016/11/main" xmlns="" r:id="rId3"/>
+                <a1611:picAttrSrcUrl xmlns:a1611="http://schemas.microsoft.com/office/drawing/2016/11/main" r:id="rId3"/>
               </a:ext>
             </a:extLst>
           </a:blip>
@@ -11264,26 +10543,39 @@
                                   </p:childTnLst>
                                 </p:cTn>
                               </p:par>
-                            </p:childTnLst>
-                          </p:cTn>
-                        </p:par>
-                      </p:childTnLst>
-                    </p:cTn>
-                  </p:par>
-                  <p:par>
-                    <p:cTn id="9" fill="hold">
-                      <p:stCondLst>
-                        <p:cond delay="indefinite"/>
-                      </p:stCondLst>
-                      <p:childTnLst>
-                        <p:par>
-                          <p:cTn id="10" fill="hold">
-                            <p:stCondLst>
-                              <p:cond delay="0"/>
-                            </p:stCondLst>
-                            <p:childTnLst>
                               <p:par>
-                                <p:cTn id="11" presetID="1" presetClass="entr" presetSubtype="0" fill="hold" grpId="0" nodeType="clickEffect">
+                                <p:cTn id="9" presetID="1" presetClass="entr" presetSubtype="0" fill="hold" grpId="0" nodeType="withEffect">
+                                  <p:stCondLst>
+                                    <p:cond delay="0"/>
+                                  </p:stCondLst>
+                                  <p:childTnLst>
+                                    <p:set>
+                                      <p:cBhvr>
+                                        <p:cTn id="10" dur="1" fill="hold">
+                                          <p:stCondLst>
+                                            <p:cond delay="0"/>
+                                          </p:stCondLst>
+                                        </p:cTn>
+                                        <p:tgtEl>
+                                          <p:spTgt spid="3">
+                                            <p:txEl>
+                                              <p:pRg st="2" end="2"/>
+                                            </p:txEl>
+                                          </p:spTgt>
+                                        </p:tgtEl>
+                                        <p:attrNameLst>
+                                          <p:attrName>style.visibility</p:attrName>
+                                        </p:attrNameLst>
+                                      </p:cBhvr>
+                                      <p:to>
+                                        <p:strVal val="visible"/>
+                                      </p:to>
+                                    </p:set>
+                                  </p:childTnLst>
+                                </p:cTn>
+                              </p:par>
+                              <p:par>
+                                <p:cTn id="11" presetID="1" presetClass="entr" presetSubtype="0" fill="hold" grpId="0" nodeType="withEffect">
                                   <p:stCondLst>
                                     <p:cond delay="0"/>
                                   </p:stCondLst>
@@ -11298,7 +10590,7 @@
                                         <p:tgtEl>
                                           <p:spTgt spid="3">
                                             <p:txEl>
-                                              <p:pRg st="2" end="2"/>
+                                              <p:pRg st="3" end="3"/>
                                             </p:txEl>
                                           </p:spTgt>
                                         </p:tgtEl>
@@ -11419,7 +10711,7 @@
         </p:spPr>
         <p:txBody>
           <a:bodyPr>
-            <a:normAutofit fontScale="92500" lnSpcReduction="20000"/>
+            <a:normAutofit/>
           </a:bodyPr>
           <a:lstStyle/>
           <a:p>
@@ -11430,10 +10722,6 @@
               <a:rPr lang="en-CA" sz="2400" b="1" dirty="0"/>
               <a:t>Simple (literal) Regular Expressions With Linux Commands</a:t>
             </a:r>
-            <a:br>
-              <a:rPr lang="en-CA" sz="2400" b="1" dirty="0"/>
-            </a:br>
-            <a:endParaRPr lang="en-CA" sz="1800" b="1" dirty="0"/>
           </a:p>
           <a:p>
             <a:pPr marL="0" indent="0">
@@ -11456,12 +10744,8 @@
             </a:br>
             <a:r>
               <a:rPr lang="en-US" sz="1800" dirty="0"/>
-              <a:t>(for example words or phases).</a:t>
-            </a:r>
-            <a:br>
-              <a:rPr lang="en-US" sz="1800" dirty="0"/>
-            </a:br>
-            <a:endParaRPr lang="en-US" sz="1800" dirty="0"/>
+              <a:t>(for example: words or phrases).</a:t>
+            </a:r>
           </a:p>
           <a:p>
             <a:pPr marL="0" indent="0">
@@ -11513,10 +10797,6 @@
               <a:rPr lang="en-CA" sz="1800" dirty="0"/>
               <a:t> a regular expression.</a:t>
             </a:r>
-            <a:br>
-              <a:rPr lang="en-CA" sz="1800" dirty="0"/>
-            </a:br>
-            <a:endParaRPr lang="en-CA" sz="1800" dirty="0"/>
           </a:p>
           <a:p>
             <a:pPr marL="0" indent="0">
@@ -11525,17 +10805,6 @@
             <a:r>
               <a:rPr lang="en-CA" sz="1800" i="1" dirty="0"/>
               <a:t>Example: </a:t>
-            </a:r>
-            <a:r>
-              <a:rPr lang="en-CA" sz="1800" b="1" dirty="0"/>
-              <a:t/>
-            </a:r>
-            <a:br>
-              <a:rPr lang="en-CA" sz="1800" b="1" dirty="0"/>
-            </a:br>
-            <a:r>
-              <a:rPr lang="en-CA" sz="1800" b="1" dirty="0"/>
-              <a:t/>
             </a:r>
             <a:br>
               <a:rPr lang="en-CA" sz="1800" b="1" dirty="0"/>
@@ -11548,7 +10817,7 @@
                 <a:latin typeface="Courier New" panose="02070309020205020404" pitchFamily="49" charset="0"/>
                 <a:cs typeface="Courier New" panose="02070309020205020404" pitchFamily="49" charset="0"/>
               </a:rPr>
-              <a:t>grep Linux </a:t>
+              <a:t>grep “Linux” </a:t>
             </a:r>
             <a:r>
               <a:rPr lang="en-CA" sz="1800" b="1" dirty="0" err="1">
@@ -11560,82 +10829,6 @@
               </a:rPr>
               <a:t>document.txt</a:t>
             </a:r>
-            <a:r>
-              <a:rPr lang="en-CA" sz="1800" b="1" dirty="0">
-                <a:solidFill>
-                  <a:srgbClr val="0070C0"/>
-                </a:solidFill>
-                <a:latin typeface="Courier New" panose="02070309020205020404" pitchFamily="49" charset="0"/>
-                <a:cs typeface="Courier New" panose="02070309020205020404" pitchFamily="49" charset="0"/>
-              </a:rPr>
-              <a:t/>
-            </a:r>
-            <a:br>
-              <a:rPr lang="en-CA" sz="1800" b="1" dirty="0">
-                <a:solidFill>
-                  <a:srgbClr val="0070C0"/>
-                </a:solidFill>
-                <a:latin typeface="Courier New" panose="02070309020205020404" pitchFamily="49" charset="0"/>
-                <a:cs typeface="Courier New" panose="02070309020205020404" pitchFamily="49" charset="0"/>
-              </a:rPr>
-            </a:br>
-            <a:r>
-              <a:rPr lang="en-CA" sz="1800" b="1" dirty="0">
-                <a:solidFill>
-                  <a:srgbClr val="0070C0"/>
-                </a:solidFill>
-                <a:latin typeface="Courier New" panose="02070309020205020404" pitchFamily="49" charset="0"/>
-                <a:cs typeface="Courier New" panose="02070309020205020404" pitchFamily="49" charset="0"/>
-              </a:rPr>
-              <a:t/>
-            </a:r>
-            <a:br>
-              <a:rPr lang="en-CA" sz="1800" b="1" dirty="0">
-                <a:solidFill>
-                  <a:srgbClr val="0070C0"/>
-                </a:solidFill>
-                <a:latin typeface="Courier New" panose="02070309020205020404" pitchFamily="49" charset="0"/>
-                <a:cs typeface="Courier New" panose="02070309020205020404" pitchFamily="49" charset="0"/>
-              </a:rPr>
-            </a:br>
-            <a:r>
-              <a:rPr lang="en-CA" sz="1800" b="1" dirty="0">
-                <a:solidFill>
-                  <a:srgbClr val="0070C0"/>
-                </a:solidFill>
-                <a:latin typeface="Courier New" panose="02070309020205020404" pitchFamily="49" charset="0"/>
-                <a:cs typeface="Courier New" panose="02070309020205020404" pitchFamily="49" charset="0"/>
-              </a:rPr>
-              <a:t/>
-            </a:r>
-            <a:br>
-              <a:rPr lang="en-CA" sz="1800" b="1" dirty="0">
-                <a:solidFill>
-                  <a:srgbClr val="0070C0"/>
-                </a:solidFill>
-                <a:latin typeface="Courier New" panose="02070309020205020404" pitchFamily="49" charset="0"/>
-                <a:cs typeface="Courier New" panose="02070309020205020404" pitchFamily="49" charset="0"/>
-              </a:rPr>
-            </a:br>
-            <a:r>
-              <a:rPr lang="en-CA" sz="1800" b="1" dirty="0">
-                <a:solidFill>
-                  <a:srgbClr val="0070C0"/>
-                </a:solidFill>
-                <a:latin typeface="Courier New" panose="02070309020205020404" pitchFamily="49" charset="0"/>
-                <a:cs typeface="Courier New" panose="02070309020205020404" pitchFamily="49" charset="0"/>
-              </a:rPr>
-              <a:t/>
-            </a:r>
-            <a:br>
-              <a:rPr lang="en-CA" sz="1800" b="1" dirty="0">
-                <a:solidFill>
-                  <a:srgbClr val="0070C0"/>
-                </a:solidFill>
-                <a:latin typeface="Courier New" panose="02070309020205020404" pitchFamily="49" charset="0"/>
-                <a:cs typeface="Courier New" panose="02070309020205020404" pitchFamily="49" charset="0"/>
-              </a:rPr>
-            </a:br>
             <a:endParaRPr lang="en-US" sz="1800" b="1" dirty="0">
               <a:solidFill>
                 <a:srgbClr val="0070C0"/>
@@ -11699,7 +10892,7 @@
           <a:blip r:embed="rId3">
             <a:extLst>
               <a:ext uri="{837473B0-CC2E-450A-ABE3-18F120FF3D39}">
-                <a1611:picAttrSrcUrl xmlns:a1611="http://schemas.microsoft.com/office/drawing/2016/11/main" xmlns="" r:id="rId4"/>
+                <a1611:picAttrSrcUrl xmlns:a1611="http://schemas.microsoft.com/office/drawing/2016/11/main" r:id="rId4"/>
               </a:ext>
             </a:extLst>
           </a:blip>
@@ -11812,33 +11005,15 @@
                                   </p:childTnLst>
                                 </p:cTn>
                               </p:par>
-                            </p:childTnLst>
-                          </p:cTn>
-                        </p:par>
-                      </p:childTnLst>
-                    </p:cTn>
-                  </p:par>
-                  <p:par>
-                    <p:cTn id="9" fill="hold">
-                      <p:stCondLst>
-                        <p:cond delay="indefinite"/>
-                      </p:stCondLst>
-                      <p:childTnLst>
-                        <p:par>
-                          <p:cTn id="10" fill="hold">
-                            <p:stCondLst>
-                              <p:cond delay="0"/>
-                            </p:stCondLst>
-                            <p:childTnLst>
                               <p:par>
-                                <p:cTn id="11" presetID="1" presetClass="entr" presetSubtype="0" fill="hold" grpId="0" nodeType="clickEffect">
+                                <p:cTn id="9" presetID="1" presetClass="entr" presetSubtype="0" fill="hold" grpId="0" nodeType="withEffect">
                                   <p:stCondLst>
                                     <p:cond delay="0"/>
                                   </p:stCondLst>
                                   <p:childTnLst>
                                     <p:set>
                                       <p:cBhvr>
-                                        <p:cTn id="12" dur="1" fill="hold">
+                                        <p:cTn id="10" dur="1" fill="hold">
                                           <p:stCondLst>
                                             <p:cond delay="0"/>
                                           </p:stCondLst>
@@ -11868,26 +11043,26 @@
                     </p:cTn>
                   </p:par>
                   <p:par>
-                    <p:cTn id="13" fill="hold">
+                    <p:cTn id="11" fill="hold">
                       <p:stCondLst>
                         <p:cond delay="indefinite"/>
                       </p:stCondLst>
                       <p:childTnLst>
                         <p:par>
-                          <p:cTn id="14" fill="hold">
+                          <p:cTn id="12" fill="hold">
                             <p:stCondLst>
                               <p:cond delay="0"/>
                             </p:stCondLst>
                             <p:childTnLst>
                               <p:par>
-                                <p:cTn id="15" presetID="1" presetClass="entr" presetSubtype="0" fill="hold" grpId="0" nodeType="clickEffect">
+                                <p:cTn id="13" presetID="1" presetClass="entr" presetSubtype="0" fill="hold" grpId="0" nodeType="clickEffect">
                                   <p:stCondLst>
                                     <p:cond delay="0"/>
                                   </p:stCondLst>
                                   <p:childTnLst>
                                     <p:set>
                                       <p:cBhvr>
-                                        <p:cTn id="16" dur="1" fill="hold">
+                                        <p:cTn id="14" dur="1" fill="hold">
                                           <p:stCondLst>
                                             <p:cond delay="0"/>
                                           </p:stCondLst>
@@ -11911,14 +11086,14 @@
                                 </p:cTn>
                               </p:par>
                               <p:par>
-                                <p:cTn id="17" presetID="1" presetClass="entr" presetSubtype="0" fill="hold" nodeType="withEffect">
+                                <p:cTn id="15" presetID="1" presetClass="entr" presetSubtype="0" fill="hold" nodeType="withEffect">
                                   <p:stCondLst>
                                     <p:cond delay="0"/>
                                   </p:stCondLst>
                                   <p:childTnLst>
                                     <p:set>
                                       <p:cBhvr>
-                                        <p:cTn id="18" dur="1" fill="hold">
+                                        <p:cTn id="16" dur="1" fill="hold">
                                           <p:stCondLst>
                                             <p:cond delay="0"/>
                                           </p:stCondLst>
@@ -12043,7 +11218,7 @@
         </p:spPr>
         <p:txBody>
           <a:bodyPr>
-            <a:normAutofit fontScale="85000" lnSpcReduction="20000"/>
+            <a:normAutofit/>
           </a:bodyPr>
           <a:lstStyle/>
           <a:p>
@@ -12084,12 +11259,6 @@
             <a:pPr marL="0" indent="0">
               <a:buNone/>
             </a:pPr>
-            <a:endParaRPr lang="en-US" dirty="0"/>
-          </a:p>
-          <a:p>
-            <a:pPr marL="0" indent="0">
-              <a:buNone/>
-            </a:pPr>
             <a:r>
               <a:rPr lang="en-US" dirty="0"/>
               <a:t>The </a:t>
@@ -12153,30 +11322,16 @@
             <a:pPr marL="0" indent="0">
               <a:buNone/>
             </a:pPr>
-            <a:endParaRPr lang="en-US" dirty="0"/>
-          </a:p>
-          <a:p>
-            <a:pPr marL="0" indent="0">
-              <a:buNone/>
-            </a:pPr>
             <a:r>
               <a:rPr lang="en-US" i="1" dirty="0"/>
               <a:t>Examples:</a:t>
             </a:r>
-            <a:r>
-              <a:rPr lang="en-US" dirty="0"/>
-              <a:t/>
-            </a:r>
-            <a:br>
-              <a:rPr lang="en-US" dirty="0"/>
-            </a:br>
-            <a:r>
-              <a:rPr lang="en-US" dirty="0"/>
-              <a:t/>
-            </a:r>
-            <a:br>
-              <a:rPr lang="en-US" dirty="0"/>
-            </a:br>
+            <a:endParaRPr lang="en-US" dirty="0"/>
+          </a:p>
+          <a:p>
+            <a:pPr marL="0" indent="0">
+              <a:buNone/>
+            </a:pPr>
             <a:r>
               <a:rPr lang="en-US" b="1" dirty="0">
                 <a:solidFill>
@@ -12185,7 +11340,7 @@
                 <a:latin typeface="Courier New" panose="02070309020205020404" pitchFamily="49" charset="0"/>
                 <a:cs typeface="Courier New" panose="02070309020205020404" pitchFamily="49" charset="0"/>
               </a:rPr>
-              <a:t>ls | grep txt</a:t>
+              <a:t>ls | grep “txt”</a:t>
             </a:r>
             <a:br>
               <a:rPr lang="en-US" b="1" dirty="0">
@@ -12204,36 +11359,8 @@
                 <a:latin typeface="Courier New" panose="02070309020205020404" pitchFamily="49" charset="0"/>
                 <a:cs typeface="Courier New" panose="02070309020205020404" pitchFamily="49" charset="0"/>
               </a:rPr>
-              <a:t>who | grep khan | head -20</a:t>
-            </a:r>
-            <a:br>
-              <a:rPr lang="en-US" b="1" dirty="0">
-                <a:solidFill>
-                  <a:srgbClr val="0070C0"/>
-                </a:solidFill>
-                <a:latin typeface="Courier New" panose="02070309020205020404" pitchFamily="49" charset="0"/>
-                <a:cs typeface="Courier New" panose="02070309020205020404" pitchFamily="49" charset="0"/>
-              </a:rPr>
-            </a:br>
-            <a:r>
-              <a:rPr lang="en-US" b="1" dirty="0">
-                <a:solidFill>
-                  <a:srgbClr val="0070C0"/>
-                </a:solidFill>
-                <a:latin typeface="Courier New" panose="02070309020205020404" pitchFamily="49" charset="0"/>
-                <a:cs typeface="Courier New" panose="02070309020205020404" pitchFamily="49" charset="0"/>
-              </a:rPr>
-              <a:t/>
-            </a:r>
-            <a:br>
-              <a:rPr lang="en-US" b="1" dirty="0">
-                <a:solidFill>
-                  <a:srgbClr val="0070C0"/>
-                </a:solidFill>
-                <a:latin typeface="Courier New" panose="02070309020205020404" pitchFamily="49" charset="0"/>
-                <a:cs typeface="Courier New" panose="02070309020205020404" pitchFamily="49" charset="0"/>
-              </a:rPr>
-            </a:br>
+              <a:t>who | grep “khan” | head -20</a:t>
+            </a:r>
             <a:endParaRPr lang="en-CA" b="1" dirty="0">
               <a:solidFill>
                 <a:srgbClr val="0070C0"/>
@@ -12332,7 +11459,7 @@
           <a:blip r:embed="rId4">
             <a:extLst>
               <a:ext uri="{837473B0-CC2E-450A-ABE3-18F120FF3D39}">
-                <a1611:picAttrSrcUrl xmlns:a1611="http://schemas.microsoft.com/office/drawing/2016/11/main" xmlns="" r:id="rId5"/>
+                <a1611:picAttrSrcUrl xmlns:a1611="http://schemas.microsoft.com/office/drawing/2016/11/main" r:id="rId5"/>
               </a:ext>
             </a:extLst>
           </a:blip>
@@ -12445,33 +11572,15 @@
                                   </p:childTnLst>
                                 </p:cTn>
                               </p:par>
-                            </p:childTnLst>
-                          </p:cTn>
-                        </p:par>
-                      </p:childTnLst>
-                    </p:cTn>
-                  </p:par>
-                  <p:par>
-                    <p:cTn id="9" fill="hold">
-                      <p:stCondLst>
-                        <p:cond delay="indefinite"/>
-                      </p:stCondLst>
-                      <p:childTnLst>
-                        <p:par>
-                          <p:cTn id="10" fill="hold">
-                            <p:stCondLst>
-                              <p:cond delay="0"/>
-                            </p:stCondLst>
-                            <p:childTnLst>
                               <p:par>
-                                <p:cTn id="11" presetID="1" presetClass="entr" presetSubtype="0" fill="hold" grpId="0" nodeType="clickEffect">
+                                <p:cTn id="9" presetID="1" presetClass="entr" presetSubtype="0" fill="hold" grpId="0" nodeType="withEffect">
                                   <p:stCondLst>
                                     <p:cond delay="0"/>
                                   </p:stCondLst>
                                   <p:childTnLst>
                                     <p:set>
                                       <p:cBhvr>
-                                        <p:cTn id="12" dur="1" fill="hold">
+                                        <p:cTn id="10" dur="1" fill="hold">
                                           <p:stCondLst>
                                             <p:cond delay="0"/>
                                           </p:stCondLst>
@@ -12479,7 +11588,7 @@
                                         <p:tgtEl>
                                           <p:spTgt spid="3">
                                             <p:txEl>
-                                              <p:pRg st="3" end="3"/>
+                                              <p:pRg st="2" end="2"/>
                                             </p:txEl>
                                           </p:spTgt>
                                         </p:tgtEl>
@@ -12495,14 +11604,14 @@
                                 </p:cTn>
                               </p:par>
                               <p:par>
-                                <p:cTn id="13" presetID="1" presetClass="entr" presetSubtype="0" fill="hold" nodeType="withEffect">
+                                <p:cTn id="11" presetID="1" presetClass="entr" presetSubtype="0" fill="hold" nodeType="withEffect">
                                   <p:stCondLst>
                                     <p:cond delay="0"/>
                                   </p:stCondLst>
                                   <p:childTnLst>
                                     <p:set>
                                       <p:cBhvr>
-                                        <p:cTn id="14" dur="1" fill="hold">
+                                        <p:cTn id="12" dur="1" fill="hold">
                                           <p:stCondLst>
                                             <p:cond delay="0"/>
                                           </p:stCondLst>
@@ -12528,26 +11637,26 @@
                     </p:cTn>
                   </p:par>
                   <p:par>
-                    <p:cTn id="15" fill="hold">
+                    <p:cTn id="13" fill="hold">
                       <p:stCondLst>
                         <p:cond delay="indefinite"/>
                       </p:stCondLst>
                       <p:childTnLst>
                         <p:par>
-                          <p:cTn id="16" fill="hold">
+                          <p:cTn id="14" fill="hold">
                             <p:stCondLst>
                               <p:cond delay="0"/>
                             </p:stCondLst>
                             <p:childTnLst>
                               <p:par>
-                                <p:cTn id="17" presetID="1" presetClass="entr" presetSubtype="0" fill="hold" grpId="0" nodeType="clickEffect">
+                                <p:cTn id="15" presetID="1" presetClass="entr" presetSubtype="0" fill="hold" grpId="0" nodeType="clickEffect">
                                   <p:stCondLst>
                                     <p:cond delay="0"/>
                                   </p:stCondLst>
                                   <p:childTnLst>
                                     <p:set>
                                       <p:cBhvr>
-                                        <p:cTn id="18" dur="1" fill="hold">
+                                        <p:cTn id="16" dur="1" fill="hold">
                                           <p:stCondLst>
                                             <p:cond delay="0"/>
                                           </p:stCondLst>
@@ -12555,7 +11664,56 @@
                                         <p:tgtEl>
                                           <p:spTgt spid="3">
                                             <p:txEl>
-                                              <p:pRg st="5" end="5"/>
+                                              <p:pRg st="3" end="3"/>
+                                            </p:txEl>
+                                          </p:spTgt>
+                                        </p:tgtEl>
+                                        <p:attrNameLst>
+                                          <p:attrName>style.visibility</p:attrName>
+                                        </p:attrNameLst>
+                                      </p:cBhvr>
+                                      <p:to>
+                                        <p:strVal val="visible"/>
+                                      </p:to>
+                                    </p:set>
+                                  </p:childTnLst>
+                                </p:cTn>
+                              </p:par>
+                            </p:childTnLst>
+                          </p:cTn>
+                        </p:par>
+                      </p:childTnLst>
+                    </p:cTn>
+                  </p:par>
+                  <p:par>
+                    <p:cTn id="17" fill="hold">
+                      <p:stCondLst>
+                        <p:cond delay="indefinite"/>
+                      </p:stCondLst>
+                      <p:childTnLst>
+                        <p:par>
+                          <p:cTn id="18" fill="hold">
+                            <p:stCondLst>
+                              <p:cond delay="0"/>
+                            </p:stCondLst>
+                            <p:childTnLst>
+                              <p:par>
+                                <p:cTn id="19" presetID="1" presetClass="entr" presetSubtype="0" fill="hold" grpId="0" nodeType="clickEffect">
+                                  <p:stCondLst>
+                                    <p:cond delay="0"/>
+                                  </p:stCondLst>
+                                  <p:childTnLst>
+                                    <p:set>
+                                      <p:cBhvr>
+                                        <p:cTn id="20" dur="1" fill="hold">
+                                          <p:stCondLst>
+                                            <p:cond delay="0"/>
+                                          </p:stCondLst>
+                                        </p:cTn>
+                                        <p:tgtEl>
+                                          <p:spTgt spid="3">
+                                            <p:txEl>
+                                              <p:pRg st="4" end="4"/>
                                             </p:txEl>
                                           </p:spTgt>
                                         </p:tgtEl>
@@ -12571,14 +11729,14 @@
                                 </p:cTn>
                               </p:par>
                               <p:par>
-                                <p:cTn id="19" presetID="1" presetClass="entr" presetSubtype="0" fill="hold" nodeType="withEffect">
+                                <p:cTn id="21" presetID="1" presetClass="entr" presetSubtype="0" fill="hold" nodeType="withEffect">
                                   <p:stCondLst>
                                     <p:cond delay="0"/>
                                   </p:stCondLst>
                                   <p:childTnLst>
                                     <p:set>
                                       <p:cBhvr>
-                                        <p:cTn id="20" dur="1" fill="hold">
+                                        <p:cTn id="22" dur="1" fill="hold">
                                           <p:stCondLst>
                                             <p:cond delay="0"/>
                                           </p:stCondLst>
@@ -12743,80 +11901,36 @@
             <a:br>
               <a:rPr lang="en-US" dirty="0"/>
             </a:br>
-            <a:r>
-              <a:rPr lang="en-US" dirty="0"/>
-              <a:t/>
-            </a:r>
             <a:br>
               <a:rPr lang="en-US" dirty="0"/>
             </a:br>
-            <a:r>
-              <a:rPr lang="en-US" dirty="0"/>
-              <a:t/>
-            </a:r>
             <a:br>
               <a:rPr lang="en-US" dirty="0"/>
             </a:br>
-            <a:r>
-              <a:rPr lang="en-US" dirty="0"/>
-              <a:t/>
-            </a:r>
             <a:br>
               <a:rPr lang="en-US" dirty="0"/>
             </a:br>
-            <a:r>
-              <a:rPr lang="en-US" dirty="0"/>
-              <a:t/>
-            </a:r>
             <a:br>
               <a:rPr lang="en-US" dirty="0"/>
             </a:br>
-            <a:r>
-              <a:rPr lang="en-US" dirty="0"/>
-              <a:t/>
-            </a:r>
             <a:br>
               <a:rPr lang="en-US" dirty="0"/>
             </a:br>
-            <a:r>
-              <a:rPr lang="en-US" dirty="0"/>
-              <a:t/>
-            </a:r>
             <a:br>
               <a:rPr lang="en-US" dirty="0"/>
             </a:br>
-            <a:r>
-              <a:rPr lang="en-US" dirty="0"/>
-              <a:t/>
-            </a:r>
             <a:br>
               <a:rPr lang="en-US" dirty="0"/>
             </a:br>
-            <a:r>
-              <a:rPr lang="en-US" dirty="0"/>
-              <a:t/>
-            </a:r>
             <a:br>
               <a:rPr lang="en-US" dirty="0"/>
             </a:br>
-            <a:r>
-              <a:rPr lang="en-US" dirty="0"/>
-              <a:t/>
-            </a:r>
             <a:br>
               <a:rPr lang="en-US" dirty="0"/>
             </a:br>
-            <a:r>
-              <a:rPr lang="en-US" dirty="0"/>
-              <a:t/>
-            </a:r>
             <a:br>
               <a:rPr lang="en-US" dirty="0"/>
             </a:br>
-            <a:r>
-              <a:rPr lang="en-US" dirty="0"/>
-              <a:t/>
-            </a:r>
             <a:br>
               <a:rPr lang="en-US" dirty="0"/>
             </a:br>
@@ -12848,7 +11962,7 @@
           <a:blip r:embed="rId2">
             <a:extLst>
               <a:ext uri="{837473B0-CC2E-450A-ABE3-18F120FF3D39}">
-                <a1611:picAttrSrcUrl xmlns:a1611="http://schemas.microsoft.com/office/drawing/2016/11/main" xmlns="" r:id="rId3"/>
+                <a1611:picAttrSrcUrl xmlns:a1611="http://schemas.microsoft.com/office/drawing/2016/11/main" r:id="rId3"/>
               </a:ext>
             </a:extLst>
           </a:blip>
@@ -13061,13 +12175,13 @@
         </p:nvSpPr>
         <p:spPr>
           <a:xfrm>
-            <a:off x="1451576" y="1706813"/>
-            <a:ext cx="7895623" cy="4755771"/>
+            <a:off x="1451577" y="1706813"/>
+            <a:ext cx="7501924" cy="4755771"/>
           </a:xfrm>
         </p:spPr>
         <p:txBody>
           <a:bodyPr>
-            <a:normAutofit fontScale="85000" lnSpcReduction="20000"/>
+            <a:normAutofit fontScale="92500" lnSpcReduction="10000"/>
           </a:bodyPr>
           <a:lstStyle/>
           <a:p>
@@ -13084,22 +12198,9 @@
             <a:pPr marL="0" indent="0">
               <a:buNone/>
             </a:pPr>
-            <a:endParaRPr lang="en-US" dirty="0"/>
-          </a:p>
-          <a:p>
-            <a:pPr marL="0" indent="0">
-              <a:buNone/>
-            </a:pPr>
             <a:r>
               <a:rPr lang="en-US" dirty="0"/>
-              <a:t>The problem with using simple (literal) regular expressions </a:t>
-            </a:r>
-            <a:br>
-              <a:rPr lang="en-US" dirty="0"/>
-            </a:br>
-            <a:r>
-              <a:rPr lang="en-US" dirty="0"/>
-              <a:t>is that only </a:t>
+              <a:t>The problem with using simple (literal) regular expressions  is that only </a:t>
             </a:r>
             <a:r>
               <a:rPr lang="en-US" b="1" dirty="0"/>
@@ -13117,10 +12218,6 @@
               <a:rPr lang="en-US" dirty="0"/>
               <a:t> patterns are matched. </a:t>
             </a:r>
-            <a:br>
-              <a:rPr lang="en-US" dirty="0"/>
-            </a:br>
-            <a:endParaRPr lang="en-US" dirty="0"/>
           </a:p>
           <a:p>
             <a:pPr marL="0" indent="0">
@@ -13132,7 +12229,7 @@
             </a:r>
             <a:r>
               <a:rPr lang="en-US" b="1" dirty="0"/>
-              <a:t>pattern:</a:t>
+              <a:t>pattern</a:t>
             </a:r>
             <a:r>
               <a:rPr lang="en-US" dirty="0"/>
@@ -13148,13 +12245,15 @@
             </a:r>
             <a:r>
               <a:rPr lang="en-US" dirty="0"/>
-              <a:t> would match larger words such as</a:t>
-            </a:r>
-            <a:br>
-              <a:rPr lang="en-US" dirty="0"/>
-            </a:br>
-            <a:r>
-              <a:rPr lang="en-US" dirty="0">
+              <a:t> would match larger words such as: </a:t>
+            </a:r>
+          </a:p>
+          <a:p>
+            <a:pPr marL="457200" lvl="1" indent="0">
+              <a:buNone/>
+            </a:pPr>
+            <a:r>
+              <a:rPr lang="en-US" sz="2100" dirty="0">
                 <a:solidFill>
                   <a:srgbClr val="0070C0"/>
                 </a:solidFill>
@@ -13162,11 +12261,11 @@
               <a:t>the</a:t>
             </a:r>
             <a:r>
-              <a:rPr lang="en-US" dirty="0"/>
+              <a:rPr lang="en-US" sz="2100" dirty="0"/>
               <a:t>re, </a:t>
             </a:r>
             <a:r>
-              <a:rPr lang="en-US" dirty="0">
+              <a:rPr lang="en-US" sz="2100" dirty="0">
                 <a:solidFill>
                   <a:srgbClr val="0070C0"/>
                 </a:solidFill>
@@ -13174,11 +12273,11 @@
               <a:t>the</a:t>
             </a:r>
             <a:r>
-              <a:rPr lang="en-US" dirty="0"/>
+              <a:rPr lang="en-US" sz="2100" dirty="0"/>
               <a:t>y, ei</a:t>
             </a:r>
             <a:r>
-              <a:rPr lang="en-US" dirty="0">
+              <a:rPr lang="en-US" sz="2100" dirty="0">
                 <a:solidFill>
                   <a:srgbClr val="0070C0"/>
                 </a:solidFill>
@@ -13186,11 +12285,11 @@
               <a:t>the</a:t>
             </a:r>
             <a:r>
-              <a:rPr lang="en-US" dirty="0"/>
+              <a:rPr lang="en-US" sz="2100" dirty="0"/>
               <a:t>r, </a:t>
             </a:r>
             <a:r>
-              <a:rPr lang="en-US" dirty="0">
+              <a:rPr lang="en-US" sz="2100" dirty="0">
                 <a:solidFill>
                   <a:srgbClr val="0070C0"/>
                 </a:solidFill>
@@ -13198,11 +12297,11 @@
               <a:t>the</a:t>
             </a:r>
             <a:r>
-              <a:rPr lang="en-US" dirty="0"/>
+              <a:rPr lang="en-US" sz="2100" dirty="0"/>
               <a:t>m, </a:t>
             </a:r>
             <a:r>
-              <a:rPr lang="en-US" dirty="0">
+              <a:rPr lang="en-US" sz="2100" dirty="0">
                 <a:solidFill>
                   <a:srgbClr val="0070C0"/>
                 </a:solidFill>
@@ -13210,11 +12309,11 @@
               <a:t>the</a:t>
             </a:r>
             <a:r>
-              <a:rPr lang="en-US" dirty="0"/>
+              <a:rPr lang="en-US" sz="2100" dirty="0"/>
               <a:t>ir, in addition to the word </a:t>
             </a:r>
             <a:r>
-              <a:rPr lang="en-US" dirty="0">
+              <a:rPr lang="en-US" sz="2100" dirty="0">
                 <a:solidFill>
                   <a:srgbClr val="0070C0"/>
                 </a:solidFill>
@@ -13222,76 +12321,58 @@
               <a:t>the</a:t>
             </a:r>
             <a:r>
+              <a:rPr lang="en-US" sz="2100" dirty="0"/>
+              <a:t>.</a:t>
+            </a:r>
+          </a:p>
+          <a:p>
+            <a:pPr marL="0" indent="0">
+              <a:buNone/>
+            </a:pPr>
+            <a:r>
+              <a:rPr lang="en-US" dirty="0"/>
+              <a:t>There are also other types of patterns you may want to search such as </a:t>
+            </a:r>
+            <a:r>
+              <a:rPr lang="en-US" b="1" dirty="0"/>
+              <a:t>location</a:t>
+            </a:r>
+            <a:r>
+              <a:rPr lang="en-US" dirty="0"/>
+              <a:t> of pattern at the beginning or ending of a string</a:t>
+            </a:r>
+            <a:r>
+              <a:rPr lang="en-US" b="1" dirty="0"/>
+              <a:t>, number </a:t>
+            </a:r>
+            <a:r>
+              <a:rPr lang="en-US" dirty="0"/>
+              <a:t>of characters (or character classes) or the </a:t>
+            </a:r>
+            <a:r>
+              <a:rPr lang="en-US" b="1" dirty="0"/>
+              <a:t>number of occurrences </a:t>
+            </a:r>
+            <a:r>
+              <a:rPr lang="en-US" dirty="0"/>
+              <a:t>of a </a:t>
+            </a:r>
+            <a:r>
+              <a:rPr lang="en-US" i="1" dirty="0"/>
+              <a:t>character</a:t>
+            </a:r>
+            <a:r>
+              <a:rPr lang="en-US" dirty="0"/>
+              <a:t> or </a:t>
+            </a:r>
+            <a:r>
+              <a:rPr lang="en-US" i="1" dirty="0"/>
+              <a:t>pattern</a:t>
+            </a:r>
+            <a:r>
               <a:rPr lang="en-US" dirty="0"/>
               <a:t>.</a:t>
             </a:r>
-            <a:br>
-              <a:rPr lang="en-US" dirty="0"/>
-            </a:br>
-            <a:endParaRPr lang="en-US" dirty="0"/>
-          </a:p>
-          <a:p>
-            <a:pPr marL="0" indent="0">
-              <a:buNone/>
-            </a:pPr>
-            <a:r>
-              <a:rPr lang="en-US" dirty="0"/>
-              <a:t>There are also other types of patterns you may want to search such as</a:t>
-            </a:r>
-            <a:br>
-              <a:rPr lang="en-US" dirty="0"/>
-            </a:br>
-            <a:r>
-              <a:rPr lang="en-US" b="1" dirty="0"/>
-              <a:t>location</a:t>
-            </a:r>
-            <a:r>
-              <a:rPr lang="en-US" dirty="0"/>
-              <a:t> of pattern at the beginning or ending of a string</a:t>
-            </a:r>
-            <a:r>
-              <a:rPr lang="en-US" b="1" dirty="0"/>
-              <a:t>, number </a:t>
-            </a:r>
-            <a:r>
-              <a:rPr lang="en-US" dirty="0"/>
-              <a:t>of characters </a:t>
-            </a:r>
-            <a:br>
-              <a:rPr lang="en-US" dirty="0"/>
-            </a:br>
-            <a:r>
-              <a:rPr lang="en-US" dirty="0"/>
-              <a:t>(or character classes) or the </a:t>
-            </a:r>
-            <a:r>
-              <a:rPr lang="en-US" b="1" dirty="0"/>
-              <a:t>number of occurrences </a:t>
-            </a:r>
-            <a:r>
-              <a:rPr lang="en-US" dirty="0"/>
-              <a:t>of a </a:t>
-            </a:r>
-            <a:r>
-              <a:rPr lang="en-US" i="1" dirty="0"/>
-              <a:t>character</a:t>
-            </a:r>
-            <a:r>
-              <a:rPr lang="en-US" dirty="0"/>
-              <a:t> or </a:t>
-            </a:r>
-            <a:r>
-              <a:rPr lang="en-US" i="1" dirty="0"/>
-              <a:t>pattern</a:t>
-            </a:r>
-            <a:r>
-              <a:rPr lang="en-US" dirty="0"/>
-              <a:t>.</a:t>
-            </a:r>
-            <a:br>
-              <a:rPr lang="en-US" dirty="0"/>
-            </a:br>
-            <a:endParaRPr lang="en-US" dirty="0"/>
           </a:p>
           <a:p>
             <a:pPr marL="0" indent="0">
@@ -13317,9 +12398,11 @@
               <a:rPr lang="en-US" dirty="0"/>
               <a:t> regular expressions for more precise matches.</a:t>
             </a:r>
-            <a:br>
-              <a:rPr lang="en-US" dirty="0"/>
-            </a:br>
+          </a:p>
+          <a:p>
+            <a:pPr marL="0" indent="0">
+              <a:buNone/>
+            </a:pPr>
             <a:r>
               <a:rPr lang="en-US" dirty="0"/>
               <a:t>We will discuss </a:t>
@@ -13332,10 +12415,6 @@
               <a:rPr lang="en-US" dirty="0"/>
               <a:t>regular expressions in this lesson.</a:t>
             </a:r>
-            <a:br>
-              <a:rPr lang="en-US" dirty="0"/>
-            </a:br>
-            <a:endParaRPr lang="en-US" dirty="0"/>
           </a:p>
         </p:txBody>
       </p:sp>
@@ -13357,7 +12436,7 @@
           <a:blip r:embed="rId2">
             <a:extLst>
               <a:ext uri="{837473B0-CC2E-450A-ABE3-18F120FF3D39}">
-                <a1611:picAttrSrcUrl xmlns:a1611="http://schemas.microsoft.com/office/drawing/2016/11/main" xmlns="" r:id="rId3"/>
+                <a1611:picAttrSrcUrl xmlns:a1611="http://schemas.microsoft.com/office/drawing/2016/11/main" r:id="rId3"/>
               </a:ext>
             </a:extLst>
           </a:blip>
@@ -13455,6 +12534,37 @@
                                         <p:tgtEl>
                                           <p:spTgt spid="3">
                                             <p:txEl>
+                                              <p:pRg st="1" end="1"/>
+                                            </p:txEl>
+                                          </p:spTgt>
+                                        </p:tgtEl>
+                                        <p:attrNameLst>
+                                          <p:attrName>style.visibility</p:attrName>
+                                        </p:attrNameLst>
+                                      </p:cBhvr>
+                                      <p:to>
+                                        <p:strVal val="visible"/>
+                                      </p:to>
+                                    </p:set>
+                                  </p:childTnLst>
+                                </p:cTn>
+                              </p:par>
+                              <p:par>
+                                <p:cTn id="9" presetID="1" presetClass="entr" presetSubtype="0" fill="hold" grpId="0" nodeType="withEffect">
+                                  <p:stCondLst>
+                                    <p:cond delay="0"/>
+                                  </p:stCondLst>
+                                  <p:childTnLst>
+                                    <p:set>
+                                      <p:cBhvr>
+                                        <p:cTn id="10" dur="1" fill="hold">
+                                          <p:stCondLst>
+                                            <p:cond delay="0"/>
+                                          </p:stCondLst>
+                                        </p:cTn>
+                                        <p:tgtEl>
+                                          <p:spTgt spid="3">
+                                            <p:txEl>
                                               <p:pRg st="2" end="2"/>
                                             </p:txEl>
                                           </p:spTgt>
@@ -13470,26 +12580,8 @@
                                   </p:childTnLst>
                                 </p:cTn>
                               </p:par>
-                            </p:childTnLst>
-                          </p:cTn>
-                        </p:par>
-                      </p:childTnLst>
-                    </p:cTn>
-                  </p:par>
-                  <p:par>
-                    <p:cTn id="9" fill="hold">
-                      <p:stCondLst>
-                        <p:cond delay="indefinite"/>
-                      </p:stCondLst>
-                      <p:childTnLst>
-                        <p:par>
-                          <p:cTn id="10" fill="hold">
-                            <p:stCondLst>
-                              <p:cond delay="0"/>
-                            </p:stCondLst>
-                            <p:childTnLst>
                               <p:par>
-                                <p:cTn id="11" presetID="1" presetClass="entr" presetSubtype="0" fill="hold" grpId="0" nodeType="clickEffect">
+                                <p:cTn id="11" presetID="1" presetClass="entr" presetSubtype="0" fill="hold" grpId="0" nodeType="withEffect">
                                   <p:stCondLst>
                                     <p:cond delay="0"/>
                                   </p:stCondLst>
@@ -13568,26 +12660,39 @@
                                   </p:childTnLst>
                                 </p:cTn>
                               </p:par>
-                            </p:childTnLst>
-                          </p:cTn>
-                        </p:par>
-                      </p:childTnLst>
-                    </p:cTn>
-                  </p:par>
-                  <p:par>
-                    <p:cTn id="17" fill="hold">
-                      <p:stCondLst>
-                        <p:cond delay="indefinite"/>
-                      </p:stCondLst>
-                      <p:childTnLst>
-                        <p:par>
-                          <p:cTn id="18" fill="hold">
-                            <p:stCondLst>
-                              <p:cond delay="0"/>
-                            </p:stCondLst>
-                            <p:childTnLst>
                               <p:par>
-                                <p:cTn id="19" presetID="1" presetClass="entr" presetSubtype="0" fill="hold" grpId="0" nodeType="clickEffect">
+                                <p:cTn id="17" presetID="1" presetClass="entr" presetSubtype="0" fill="hold" grpId="0" nodeType="withEffect">
+                                  <p:stCondLst>
+                                    <p:cond delay="0"/>
+                                  </p:stCondLst>
+                                  <p:childTnLst>
+                                    <p:set>
+                                      <p:cBhvr>
+                                        <p:cTn id="18" dur="1" fill="hold">
+                                          <p:stCondLst>
+                                            <p:cond delay="0"/>
+                                          </p:stCondLst>
+                                        </p:cTn>
+                                        <p:tgtEl>
+                                          <p:spTgt spid="3">
+                                            <p:txEl>
+                                              <p:pRg st="5" end="5"/>
+                                            </p:txEl>
+                                          </p:spTgt>
+                                        </p:tgtEl>
+                                        <p:attrNameLst>
+                                          <p:attrName>style.visibility</p:attrName>
+                                        </p:attrNameLst>
+                                      </p:cBhvr>
+                                      <p:to>
+                                        <p:strVal val="visible"/>
+                                      </p:to>
+                                    </p:set>
+                                  </p:childTnLst>
+                                </p:cTn>
+                              </p:par>
+                              <p:par>
+                                <p:cTn id="19" presetID="1" presetClass="entr" presetSubtype="0" fill="hold" grpId="0" nodeType="withEffect">
                                   <p:stCondLst>
                                     <p:cond delay="0"/>
                                   </p:stCondLst>
@@ -13602,7 +12707,7 @@
                                         <p:tgtEl>
                                           <p:spTgt spid="3">
                                             <p:txEl>
-                                              <p:pRg st="5" end="5"/>
+                                              <p:pRg st="6" end="6"/>
                                             </p:txEl>
                                           </p:spTgt>
                                         </p:tgtEl>

</xml_diff>